<commit_message>
Starting color guessing game
</commit_message>
<xml_diff>
--- a/Slides/Slides-week3.pptx
+++ b/Slides/Slides-week3.pptx
@@ -8,7 +8,7 @@
     <p:sldMasterId id="2147483819" r:id="rId7"/>
   </p:sldMasterIdLst>
   <p:notesMasterIdLst>
-    <p:notesMasterId r:id="rId44"/>
+    <p:notesMasterId r:id="rId40"/>
   </p:notesMasterIdLst>
   <p:sldIdLst>
     <p:sldId id="372" r:id="rId8"/>
@@ -33,20 +33,16 @@
     <p:sldId id="377" r:id="rId27"/>
     <p:sldId id="371" r:id="rId28"/>
     <p:sldId id="369" r:id="rId29"/>
-    <p:sldId id="347" r:id="rId30"/>
-    <p:sldId id="360" r:id="rId31"/>
-    <p:sldId id="363" r:id="rId32"/>
-    <p:sldId id="348" r:id="rId33"/>
-    <p:sldId id="362" r:id="rId34"/>
-    <p:sldId id="361" r:id="rId35"/>
-    <p:sldId id="349" r:id="rId36"/>
-    <p:sldId id="350" r:id="rId37"/>
-    <p:sldId id="351" r:id="rId38"/>
-    <p:sldId id="373" r:id="rId39"/>
-    <p:sldId id="374" r:id="rId40"/>
-    <p:sldId id="343" r:id="rId41"/>
-    <p:sldId id="375" r:id="rId42"/>
-    <p:sldId id="376" r:id="rId43"/>
+    <p:sldId id="363" r:id="rId30"/>
+    <p:sldId id="362" r:id="rId31"/>
+    <p:sldId id="361" r:id="rId32"/>
+    <p:sldId id="349" r:id="rId33"/>
+    <p:sldId id="350" r:id="rId34"/>
+    <p:sldId id="351" r:id="rId35"/>
+    <p:sldId id="374" r:id="rId36"/>
+    <p:sldId id="343" r:id="rId37"/>
+    <p:sldId id="375" r:id="rId38"/>
+    <p:sldId id="376" r:id="rId39"/>
   </p:sldIdLst>
   <p:sldSz cx="12192000" cy="6858000"/>
   <p:notesSz cx="6858000" cy="9144000"/>
@@ -258,7 +254,7 @@
           <a:p>
             <a:fld id="{2641D398-FF62-453F-AAB8-19BE410EB622}" type="datetimeFigureOut">
               <a:rPr lang="en-US" smtClean="0"/>
-              <a:t>7/12/2021</a:t>
+              <a:t>7/14/2021</a:t>
             </a:fld>
             <a:endParaRPr lang="en-US"/>
           </a:p>
@@ -926,7 +922,7 @@
           <a:p>
             <a:fld id="{F016F5B2-9B9A-446E-8119-542298CBE162}" type="slidenum">
               <a:rPr lang="en-US" smtClean="0"/>
-              <a:t>34</a:t>
+              <a:t>30</a:t>
             </a:fld>
             <a:endParaRPr lang="en-US"/>
           </a:p>
@@ -1074,7 +1070,7 @@
           <a:p>
             <a:fld id="{C764DE79-268F-4C1A-8933-263129D2AF90}" type="datetimeFigureOut">
               <a:rPr lang="en-US" dirty="0"/>
-              <a:t>7/12/2021</a:t>
+              <a:t>7/14/2021</a:t>
             </a:fld>
             <a:endParaRPr lang="en-US" dirty="0"/>
           </a:p>
@@ -1242,7 +1238,7 @@
           <a:p>
             <a:fld id="{C764DE79-268F-4C1A-8933-263129D2AF90}" type="datetimeFigureOut">
               <a:rPr lang="en-US" dirty="0"/>
-              <a:t>7/12/2021</a:t>
+              <a:t>7/14/2021</a:t>
             </a:fld>
             <a:endParaRPr lang="en-US" dirty="0"/>
           </a:p>
@@ -1420,7 +1416,7 @@
           <a:p>
             <a:fld id="{C764DE79-268F-4C1A-8933-263129D2AF90}" type="datetimeFigureOut">
               <a:rPr lang="en-US" dirty="0"/>
-              <a:t>7/12/2021</a:t>
+              <a:t>7/14/2021</a:t>
             </a:fld>
             <a:endParaRPr lang="en-US" dirty="0"/>
           </a:p>
@@ -1632,7 +1628,7 @@
           <a:p>
             <a:fld id="{5239D3EC-F4CC-44E8-8884-B08ADD35112B}" type="datetimeFigureOut">
               <a:rPr lang="en-US" smtClean="0"/>
-              <a:t>7/12/2021</a:t>
+              <a:t>7/14/2021</a:t>
             </a:fld>
             <a:endParaRPr lang="en-US"/>
           </a:p>
@@ -1838,7 +1834,7 @@
           <a:p>
             <a:fld id="{5239D3EC-F4CC-44E8-8884-B08ADD35112B}" type="datetimeFigureOut">
               <a:rPr lang="en-US" smtClean="0"/>
-              <a:t>7/12/2021</a:t>
+              <a:t>7/14/2021</a:t>
             </a:fld>
             <a:endParaRPr lang="en-US"/>
           </a:p>
@@ -2117,7 +2113,7 @@
           <a:p>
             <a:fld id="{5239D3EC-F4CC-44E8-8884-B08ADD35112B}" type="datetimeFigureOut">
               <a:rPr lang="en-US" smtClean="0"/>
-              <a:t>7/12/2021</a:t>
+              <a:t>7/14/2021</a:t>
             </a:fld>
             <a:endParaRPr lang="en-US"/>
           </a:p>
@@ -2382,7 +2378,7 @@
           <a:p>
             <a:fld id="{5239D3EC-F4CC-44E8-8884-B08ADD35112B}" type="datetimeFigureOut">
               <a:rPr lang="en-US" smtClean="0"/>
-              <a:t>7/12/2021</a:t>
+              <a:t>7/14/2021</a:t>
             </a:fld>
             <a:endParaRPr lang="en-US"/>
           </a:p>
@@ -2794,7 +2790,7 @@
           <a:p>
             <a:fld id="{5239D3EC-F4CC-44E8-8884-B08ADD35112B}" type="datetimeFigureOut">
               <a:rPr lang="en-US" smtClean="0"/>
-              <a:t>7/12/2021</a:t>
+              <a:t>7/14/2021</a:t>
             </a:fld>
             <a:endParaRPr lang="en-US"/>
           </a:p>
@@ -2935,7 +2931,7 @@
           <a:p>
             <a:fld id="{5239D3EC-F4CC-44E8-8884-B08ADD35112B}" type="datetimeFigureOut">
               <a:rPr lang="en-US" smtClean="0"/>
-              <a:t>7/12/2021</a:t>
+              <a:t>7/14/2021</a:t>
             </a:fld>
             <a:endParaRPr lang="en-US"/>
           </a:p>
@@ -3048,7 +3044,7 @@
           <a:p>
             <a:fld id="{5239D3EC-F4CC-44E8-8884-B08ADD35112B}" type="datetimeFigureOut">
               <a:rPr lang="en-US" smtClean="0"/>
-              <a:t>7/12/2021</a:t>
+              <a:t>7/14/2021</a:t>
             </a:fld>
             <a:endParaRPr lang="en-US"/>
           </a:p>
@@ -3363,7 +3359,7 @@
           <a:p>
             <a:fld id="{5239D3EC-F4CC-44E8-8884-B08ADD35112B}" type="datetimeFigureOut">
               <a:rPr lang="en-US" smtClean="0"/>
-              <a:t>7/12/2021</a:t>
+              <a:t>7/14/2021</a:t>
             </a:fld>
             <a:endParaRPr lang="en-US"/>
           </a:p>
@@ -3543,7 +3539,7 @@
           <a:p>
             <a:fld id="{C764DE79-268F-4C1A-8933-263129D2AF90}" type="datetimeFigureOut">
               <a:rPr lang="en-US" dirty="0"/>
-              <a:t>7/12/2021</a:t>
+              <a:t>7/14/2021</a:t>
             </a:fld>
             <a:endParaRPr lang="en-US" dirty="0"/>
           </a:p>
@@ -3826,7 +3822,7 @@
           <a:p>
             <a:fld id="{5239D3EC-F4CC-44E8-8884-B08ADD35112B}" type="datetimeFigureOut">
               <a:rPr lang="en-US" smtClean="0"/>
-              <a:t>7/12/2021</a:t>
+              <a:t>7/14/2021</a:t>
             </a:fld>
             <a:endParaRPr lang="en-US"/>
           </a:p>
@@ -4024,7 +4020,7 @@
           <a:p>
             <a:fld id="{5239D3EC-F4CC-44E8-8884-B08ADD35112B}" type="datetimeFigureOut">
               <a:rPr lang="en-US" smtClean="0"/>
-              <a:t>7/12/2021</a:t>
+              <a:t>7/14/2021</a:t>
             </a:fld>
             <a:endParaRPr lang="en-US"/>
           </a:p>
@@ -4240,7 +4236,7 @@
           <a:p>
             <a:fld id="{5239D3EC-F4CC-44E8-8884-B08ADD35112B}" type="datetimeFigureOut">
               <a:rPr lang="en-US" smtClean="0"/>
-              <a:t>7/12/2021</a:t>
+              <a:t>7/14/2021</a:t>
             </a:fld>
             <a:endParaRPr lang="en-US"/>
           </a:p>
@@ -4442,7 +4438,7 @@
           <a:p>
             <a:fld id="{846CE7D5-CF57-46EF-B807-FDD0502418D4}" type="datetimeFigureOut">
               <a:rPr lang="en-US" smtClean="0"/>
-              <a:t>7/12/2021</a:t>
+              <a:t>7/14/2021</a:t>
             </a:fld>
             <a:endParaRPr lang="en-US"/>
           </a:p>
@@ -4610,7 +4606,7 @@
           <a:p>
             <a:fld id="{846CE7D5-CF57-46EF-B807-FDD0502418D4}" type="datetimeFigureOut">
               <a:rPr lang="en-US" smtClean="0"/>
-              <a:t>7/12/2021</a:t>
+              <a:t>7/14/2021</a:t>
             </a:fld>
             <a:endParaRPr lang="en-US"/>
           </a:p>
@@ -4855,7 +4851,7 @@
           <a:p>
             <a:fld id="{846CE7D5-CF57-46EF-B807-FDD0502418D4}" type="datetimeFigureOut">
               <a:rPr lang="en-US" smtClean="0"/>
-              <a:t>7/12/2021</a:t>
+              <a:t>7/14/2021</a:t>
             </a:fld>
             <a:endParaRPr lang="en-US"/>
           </a:p>
@@ -5084,7 +5080,7 @@
           <a:p>
             <a:fld id="{846CE7D5-CF57-46EF-B807-FDD0502418D4}" type="datetimeFigureOut">
               <a:rPr lang="en-US" smtClean="0"/>
-              <a:t>7/12/2021</a:t>
+              <a:t>7/14/2021</a:t>
             </a:fld>
             <a:endParaRPr lang="en-US"/>
           </a:p>
@@ -5448,7 +5444,7 @@
           <a:p>
             <a:fld id="{846CE7D5-CF57-46EF-B807-FDD0502418D4}" type="datetimeFigureOut">
               <a:rPr lang="en-US" smtClean="0"/>
-              <a:t>7/12/2021</a:t>
+              <a:t>7/14/2021</a:t>
             </a:fld>
             <a:endParaRPr lang="en-US"/>
           </a:p>
@@ -5565,7 +5561,7 @@
           <a:p>
             <a:fld id="{846CE7D5-CF57-46EF-B807-FDD0502418D4}" type="datetimeFigureOut">
               <a:rPr lang="en-US" smtClean="0"/>
-              <a:t>7/12/2021</a:t>
+              <a:t>7/14/2021</a:t>
             </a:fld>
             <a:endParaRPr lang="en-US"/>
           </a:p>
@@ -5660,7 +5656,7 @@
           <a:p>
             <a:fld id="{846CE7D5-CF57-46EF-B807-FDD0502418D4}" type="datetimeFigureOut">
               <a:rPr lang="en-US" smtClean="0"/>
-              <a:t>7/12/2021</a:t>
+              <a:t>7/14/2021</a:t>
             </a:fld>
             <a:endParaRPr lang="en-US"/>
           </a:p>
@@ -5905,7 +5901,7 @@
           <a:p>
             <a:fld id="{C764DE79-268F-4C1A-8933-263129D2AF90}" type="datetimeFigureOut">
               <a:rPr lang="en-US" dirty="0"/>
-              <a:t>7/12/2021</a:t>
+              <a:t>7/14/2021</a:t>
             </a:fld>
             <a:endParaRPr lang="en-US" dirty="0"/>
           </a:p>
@@ -6180,7 +6176,7 @@
           <a:p>
             <a:fld id="{846CE7D5-CF57-46EF-B807-FDD0502418D4}" type="datetimeFigureOut">
               <a:rPr lang="en-US" smtClean="0"/>
-              <a:t>7/12/2021</a:t>
+              <a:t>7/14/2021</a:t>
             </a:fld>
             <a:endParaRPr lang="en-US"/>
           </a:p>
@@ -6435,7 +6431,7 @@
           <a:p>
             <a:fld id="{846CE7D5-CF57-46EF-B807-FDD0502418D4}" type="datetimeFigureOut">
               <a:rPr lang="en-US" smtClean="0"/>
-              <a:t>7/12/2021</a:t>
+              <a:t>7/14/2021</a:t>
             </a:fld>
             <a:endParaRPr lang="en-US"/>
           </a:p>
@@ -6603,7 +6599,7 @@
           <a:p>
             <a:fld id="{846CE7D5-CF57-46EF-B807-FDD0502418D4}" type="datetimeFigureOut">
               <a:rPr lang="en-US" smtClean="0"/>
-              <a:t>7/12/2021</a:t>
+              <a:t>7/14/2021</a:t>
             </a:fld>
             <a:endParaRPr lang="en-US"/>
           </a:p>
@@ -6781,7 +6777,7 @@
           <a:p>
             <a:fld id="{846CE7D5-CF57-46EF-B807-FDD0502418D4}" type="datetimeFigureOut">
               <a:rPr lang="en-US" smtClean="0"/>
-              <a:t>7/12/2021</a:t>
+              <a:t>7/14/2021</a:t>
             </a:fld>
             <a:endParaRPr lang="en-US"/>
           </a:p>
@@ -7087,7 +7083,7 @@
           <a:p>
             <a:fld id="{5239D3EC-F4CC-44E8-8884-B08ADD35112B}" type="datetimeFigureOut">
               <a:rPr lang="en-US" smtClean="0"/>
-              <a:t>7/12/2021</a:t>
+              <a:t>7/14/2021</a:t>
             </a:fld>
             <a:endParaRPr lang="en-US"/>
           </a:p>
@@ -7284,7 +7280,7 @@
           <a:p>
             <a:fld id="{5239D3EC-F4CC-44E8-8884-B08ADD35112B}" type="datetimeFigureOut">
               <a:rPr lang="en-US" smtClean="0"/>
-              <a:t>7/12/2021</a:t>
+              <a:t>7/14/2021</a:t>
             </a:fld>
             <a:endParaRPr lang="en-US"/>
           </a:p>
@@ -7718,7 +7714,7 @@
           <a:p>
             <a:fld id="{5239D3EC-F4CC-44E8-8884-B08ADD35112B}" type="datetimeFigureOut">
               <a:rPr lang="en-US" smtClean="0"/>
-              <a:t>7/12/2021</a:t>
+              <a:t>7/14/2021</a:t>
             </a:fld>
             <a:endParaRPr lang="en-US"/>
           </a:p>
@@ -7901,7 +7897,7 @@
           <a:p>
             <a:fld id="{846CE7D5-CF57-46EF-B807-FDD0502418D4}" type="datetimeFigureOut">
               <a:rPr lang="en-US" smtClean="0"/>
-              <a:t>7/12/2021</a:t>
+              <a:t>7/14/2021</a:t>
             </a:fld>
             <a:endParaRPr lang="en-US"/>
           </a:p>
@@ -8069,7 +8065,7 @@
           <a:p>
             <a:fld id="{846CE7D5-CF57-46EF-B807-FDD0502418D4}" type="datetimeFigureOut">
               <a:rPr lang="en-US" smtClean="0"/>
-              <a:t>7/12/2021</a:t>
+              <a:t>7/14/2021</a:t>
             </a:fld>
             <a:endParaRPr lang="en-US"/>
           </a:p>
@@ -8314,7 +8310,7 @@
           <a:p>
             <a:fld id="{846CE7D5-CF57-46EF-B807-FDD0502418D4}" type="datetimeFigureOut">
               <a:rPr lang="en-US" smtClean="0"/>
-              <a:t>7/12/2021</a:t>
+              <a:t>7/14/2021</a:t>
             </a:fld>
             <a:endParaRPr lang="en-US"/>
           </a:p>
@@ -8543,7 +8539,7 @@
           <a:p>
             <a:fld id="{C764DE79-268F-4C1A-8933-263129D2AF90}" type="datetimeFigureOut">
               <a:rPr lang="en-US" dirty="0"/>
-              <a:t>7/12/2021</a:t>
+              <a:t>7/14/2021</a:t>
             </a:fld>
             <a:endParaRPr lang="en-US" dirty="0"/>
           </a:p>
@@ -8772,7 +8768,7 @@
           <a:p>
             <a:fld id="{846CE7D5-CF57-46EF-B807-FDD0502418D4}" type="datetimeFigureOut">
               <a:rPr lang="en-US" smtClean="0"/>
-              <a:t>7/12/2021</a:t>
+              <a:t>7/14/2021</a:t>
             </a:fld>
             <a:endParaRPr lang="en-US"/>
           </a:p>
@@ -9136,7 +9132,7 @@
           <a:p>
             <a:fld id="{846CE7D5-CF57-46EF-B807-FDD0502418D4}" type="datetimeFigureOut">
               <a:rPr lang="en-US" smtClean="0"/>
-              <a:t>7/12/2021</a:t>
+              <a:t>7/14/2021</a:t>
             </a:fld>
             <a:endParaRPr lang="en-US"/>
           </a:p>
@@ -9253,7 +9249,7 @@
           <a:p>
             <a:fld id="{846CE7D5-CF57-46EF-B807-FDD0502418D4}" type="datetimeFigureOut">
               <a:rPr lang="en-US" smtClean="0"/>
-              <a:t>7/12/2021</a:t>
+              <a:t>7/14/2021</a:t>
             </a:fld>
             <a:endParaRPr lang="en-US"/>
           </a:p>
@@ -9348,7 +9344,7 @@
           <a:p>
             <a:fld id="{846CE7D5-CF57-46EF-B807-FDD0502418D4}" type="datetimeFigureOut">
               <a:rPr lang="en-US" smtClean="0"/>
-              <a:t>7/12/2021</a:t>
+              <a:t>7/14/2021</a:t>
             </a:fld>
             <a:endParaRPr lang="en-US"/>
           </a:p>
@@ -9623,7 +9619,7 @@
           <a:p>
             <a:fld id="{846CE7D5-CF57-46EF-B807-FDD0502418D4}" type="datetimeFigureOut">
               <a:rPr lang="en-US" smtClean="0"/>
-              <a:t>7/12/2021</a:t>
+              <a:t>7/14/2021</a:t>
             </a:fld>
             <a:endParaRPr lang="en-US"/>
           </a:p>
@@ -9878,7 +9874,7 @@
           <a:p>
             <a:fld id="{846CE7D5-CF57-46EF-B807-FDD0502418D4}" type="datetimeFigureOut">
               <a:rPr lang="en-US" smtClean="0"/>
-              <a:t>7/12/2021</a:t>
+              <a:t>7/14/2021</a:t>
             </a:fld>
             <a:endParaRPr lang="en-US"/>
           </a:p>
@@ -10046,7 +10042,7 @@
           <a:p>
             <a:fld id="{846CE7D5-CF57-46EF-B807-FDD0502418D4}" type="datetimeFigureOut">
               <a:rPr lang="en-US" smtClean="0"/>
-              <a:t>7/12/2021</a:t>
+              <a:t>7/14/2021</a:t>
             </a:fld>
             <a:endParaRPr lang="en-US"/>
           </a:p>
@@ -10224,7 +10220,7 @@
           <a:p>
             <a:fld id="{846CE7D5-CF57-46EF-B807-FDD0502418D4}" type="datetimeFigureOut">
               <a:rPr lang="en-US" smtClean="0"/>
-              <a:t>7/12/2021</a:t>
+              <a:t>7/14/2021</a:t>
             </a:fld>
             <a:endParaRPr lang="en-US"/>
           </a:p>
@@ -10588,7 +10584,7 @@
           <a:p>
             <a:fld id="{C764DE79-268F-4C1A-8933-263129D2AF90}" type="datetimeFigureOut">
               <a:rPr lang="en-US" dirty="0"/>
-              <a:t>7/12/2021</a:t>
+              <a:t>7/14/2021</a:t>
             </a:fld>
             <a:endParaRPr lang="en-US" dirty="0"/>
           </a:p>
@@ -10705,7 +10701,7 @@
           <a:p>
             <a:fld id="{C764DE79-268F-4C1A-8933-263129D2AF90}" type="datetimeFigureOut">
               <a:rPr lang="en-US" dirty="0"/>
-              <a:t>7/12/2021</a:t>
+              <a:t>7/14/2021</a:t>
             </a:fld>
             <a:endParaRPr lang="en-US" dirty="0"/>
           </a:p>
@@ -10800,7 +10796,7 @@
           <a:p>
             <a:fld id="{C764DE79-268F-4C1A-8933-263129D2AF90}" type="datetimeFigureOut">
               <a:rPr lang="en-US" dirty="0"/>
-              <a:t>7/12/2021</a:t>
+              <a:t>7/14/2021</a:t>
             </a:fld>
             <a:endParaRPr lang="en-US" dirty="0"/>
           </a:p>
@@ -11075,7 +11071,7 @@
           <a:p>
             <a:fld id="{C764DE79-268F-4C1A-8933-263129D2AF90}" type="datetimeFigureOut">
               <a:rPr lang="en-US" dirty="0"/>
-              <a:t>7/12/2021</a:t>
+              <a:t>7/14/2021</a:t>
             </a:fld>
             <a:endParaRPr lang="en-US" dirty="0"/>
           </a:p>
@@ -11327,7 +11323,7 @@
           <a:p>
             <a:fld id="{C764DE79-268F-4C1A-8933-263129D2AF90}" type="datetimeFigureOut">
               <a:rPr lang="en-US" dirty="0"/>
-              <a:t>7/12/2021</a:t>
+              <a:t>7/14/2021</a:t>
             </a:fld>
             <a:endParaRPr lang="en-US" dirty="0"/>
           </a:p>
@@ -11543,7 +11539,7 @@
           <a:p>
             <a:fld id="{C764DE79-268F-4C1A-8933-263129D2AF90}" type="datetimeFigureOut">
               <a:rPr lang="en-US" dirty="0"/>
-              <a:t>7/12/2021</a:t>
+              <a:t>7/14/2021</a:t>
             </a:fld>
             <a:endParaRPr lang="en-US" dirty="0"/>
           </a:p>
@@ -12175,7 +12171,7 @@
           <a:p>
             <a:fld id="{5239D3EC-F4CC-44E8-8884-B08ADD35112B}" type="datetimeFigureOut">
               <a:rPr lang="en-US" smtClean="0"/>
-              <a:t>7/12/2021</a:t>
+              <a:t>7/14/2021</a:t>
             </a:fld>
             <a:endParaRPr lang="en-US"/>
           </a:p>
@@ -12838,7 +12834,7 @@
           <a:p>
             <a:fld id="{846CE7D5-CF57-46EF-B807-FDD0502418D4}" type="datetimeFigureOut">
               <a:rPr lang="en-US" smtClean="0"/>
-              <a:t>7/12/2021</a:t>
+              <a:t>7/14/2021</a:t>
             </a:fld>
             <a:endParaRPr lang="en-US"/>
           </a:p>
@@ -13384,7 +13380,7 @@
           <a:p>
             <a:fld id="{846CE7D5-CF57-46EF-B807-FDD0502418D4}" type="datetimeFigureOut">
               <a:rPr lang="en-US" smtClean="0"/>
-              <a:t>7/12/2021</a:t>
+              <a:t>7/14/2021</a:t>
             </a:fld>
             <a:endParaRPr lang="en-US"/>
           </a:p>
@@ -13841,7 +13837,7 @@
         <p:spPr/>
         <p:txBody>
           <a:bodyPr vert="horz" lIns="121899" tIns="60949" rIns="121899" bIns="60949" rtlCol="0" anchor="t">
-            <a:normAutofit fontScale="85000" lnSpcReduction="20000"/>
+            <a:normAutofit fontScale="92500" lnSpcReduction="20000"/>
           </a:bodyPr>
           <a:lstStyle/>
           <a:p>
@@ -17124,35 +17120,35 @@
             <a:pPr marL="965835" lvl="1" indent="-514350">
               <a:buAutoNum type="arabicPeriod"/>
             </a:pPr>
-            <a:endParaRPr lang="en-US">
+            <a:endParaRPr lang="en-US" dirty="0">
               <a:latin typeface="Calibri Light"/>
               <a:cs typeface="Calibri Light"/>
             </a:endParaRPr>
           </a:p>
           <a:p>
             <a:pPr marL="755650" lvl="1" indent="-304165"/>
-            <a:endParaRPr lang="en-US">
+            <a:endParaRPr lang="en-US" dirty="0">
               <a:latin typeface="Calibri Light"/>
               <a:cs typeface="Calibri Light"/>
             </a:endParaRPr>
           </a:p>
           <a:p>
             <a:pPr marL="304165" indent="-304165"/>
-            <a:endParaRPr lang="en-US">
+            <a:endParaRPr lang="en-US" dirty="0">
               <a:latin typeface="Calibri Light"/>
               <a:cs typeface="Calibri Light"/>
             </a:endParaRPr>
           </a:p>
           <a:p>
             <a:pPr marL="304165" indent="-304165"/>
-            <a:endParaRPr lang="en-US">
+            <a:endParaRPr lang="en-US" dirty="0">
               <a:latin typeface="Calibri Light"/>
               <a:cs typeface="Calibri Light"/>
             </a:endParaRPr>
           </a:p>
           <a:p>
             <a:pPr marL="304165" indent="-304165"/>
-            <a:endParaRPr lang="en-US">
+            <a:endParaRPr lang="en-US" dirty="0">
               <a:latin typeface="Calibri Light"/>
               <a:cs typeface="Calibri Light"/>
             </a:endParaRPr>
@@ -19585,13 +19581,13 @@
               <a:t> </a:t>
             </a:r>
             <a:r>
-              <a:rPr lang="en-US">
+              <a:rPr lang="en-US" dirty="0">
                 <a:latin typeface="Calibri Light"/>
                 <a:cs typeface="Calibri Light"/>
               </a:rPr>
               <a:t>values:</a:t>
             </a:r>
-            <a:endParaRPr lang="en-US"/>
+            <a:endParaRPr lang="en-US" dirty="0"/>
           </a:p>
           <a:p>
             <a:pPr marL="755650" lvl="1" indent="-304165"/>
@@ -19656,7 +19652,7 @@
                 <a:latin typeface="Calibri Light"/>
                 <a:cs typeface="Calibri Light"/>
               </a:rPr>
-              <a:t> and </a:t>
+              <a:t>   and   </a:t>
             </a:r>
             <a:r>
               <a:rPr lang="en-US" dirty="0">
@@ -19685,7 +19681,7 @@
           <a:p>
             <a:pPr marL="755650" lvl="1" indent="-304165"/>
             <a:r>
-              <a:rPr lang="en-US" err="1">
+              <a:rPr lang="en-US" dirty="0" err="1">
                 <a:solidFill>
                   <a:srgbClr val="C00000"/>
                 </a:solidFill>
@@ -19737,7 +19733,7 @@
               </a:rPr>
               <a:t>!</a:t>
             </a:r>
-            <a:endParaRPr lang="en-US"/>
+            <a:endParaRPr lang="en-US" dirty="0"/>
           </a:p>
         </p:txBody>
       </p:sp>
@@ -19885,14 +19881,14 @@
               </a:spcAft>
             </a:pPr>
             <a:r>
-              <a:rPr lang="en-US" dirty="0">
+              <a:rPr lang="en-US" sz="2400" dirty="0">
                 <a:latin typeface="Calibri Light"/>
                 <a:cs typeface="Calibri Light"/>
               </a:rPr>
               <a:t>Logical </a:t>
             </a:r>
             <a:r>
-              <a:rPr lang="en-US" b="1" dirty="0">
+              <a:rPr lang="en-US" sz="2400" b="1" dirty="0">
                 <a:solidFill>
                   <a:srgbClr val="A83DA3"/>
                 </a:solidFill>
@@ -19902,7 +19898,7 @@
               <a:t>AND </a:t>
             </a:r>
             <a:r>
-              <a:rPr lang="en-US" b="1" dirty="0">
+              <a:rPr lang="en-US" sz="2400" b="1" dirty="0">
                 <a:solidFill>
                   <a:srgbClr val="0070C0"/>
                 </a:solidFill>
@@ -19912,27 +19908,27 @@
               <a:t>&amp;&amp;</a:t>
             </a:r>
             <a:r>
-              <a:rPr lang="en-US" dirty="0">
+              <a:rPr lang="en-US" sz="2400" dirty="0">
                 <a:latin typeface="Calibri Light"/>
                 <a:cs typeface="Calibri Light"/>
               </a:rPr>
               <a:t>: Returns first </a:t>
             </a:r>
             <a:r>
-              <a:rPr lang="en-US" dirty="0" err="1">
+              <a:rPr lang="en-US" sz="2400" dirty="0" err="1">
                 <a:latin typeface="Calibri Light"/>
                 <a:cs typeface="Calibri Light"/>
               </a:rPr>
               <a:t>falsy</a:t>
             </a:r>
             <a:r>
-              <a:rPr lang="en-US" dirty="0">
+              <a:rPr lang="en-US" sz="2400" dirty="0">
                 <a:latin typeface="Calibri Light"/>
                 <a:cs typeface="Calibri Light"/>
               </a:rPr>
               <a:t> value or last truthy value</a:t>
             </a:r>
-            <a:endParaRPr lang="en-US" dirty="0">
+            <a:endParaRPr lang="en-US" sz="2400" dirty="0">
               <a:cs typeface="Calibri" panose="020F0502020204030204"/>
             </a:endParaRPr>
           </a:p>
@@ -19968,26 +19964,28 @@
               </a:rPr>
               <a:t>?</a:t>
             </a:r>
-            <a:endParaRPr lang="en-US" sz="2400">
+            <a:endParaRPr lang="en-US" sz="2400" dirty="0">
               <a:latin typeface="Calibri" panose="020F0502020204030204"/>
               <a:cs typeface="Calibri" panose="020F0502020204030204"/>
             </a:endParaRPr>
           </a:p>
           <a:p>
             <a:pPr marL="0" indent="0">
+              <a:lnSpc>
+                <a:spcPct val="150000"/>
+              </a:lnSpc>
+              <a:spcBef>
+                <a:spcPts val="0"/>
+              </a:spcBef>
               <a:buNone/>
             </a:pPr>
             <a:r>
-              <a:rPr lang="en-US" sz="1800" dirty="0">
-                <a:latin typeface="Calibri Light"/>
-                <a:cs typeface="Calibri Light"/>
-              </a:rPr>
-              <a:t>(For practice, enter into your JavaScript console to confirm your answer)</a:t>
-            </a:r>
-            <a:endParaRPr lang="en-US" sz="2000" dirty="0">
-              <a:ea typeface="+mn-lt"/>
-              <a:cs typeface="+mn-lt"/>
-            </a:endParaRPr>
+              <a:rPr lang="en-US" sz="2400" dirty="0">
+                <a:latin typeface="Calibri Light"/>
+                <a:cs typeface="Calibri Light"/>
+              </a:rPr>
+              <a:t>-----------------------------------------------------------------------------------------------------</a:t>
+            </a:r>
           </a:p>
           <a:p>
             <a:pPr marL="304165" indent="-304165">
@@ -19998,29 +19996,15 @@
                 <a:spcPts val="0"/>
               </a:spcBef>
             </a:pPr>
-            <a:endParaRPr lang="en-US" dirty="0">
-              <a:latin typeface="Calibri Light"/>
-              <a:cs typeface="Calibri Light"/>
-            </a:endParaRPr>
-          </a:p>
-          <a:p>
-            <a:pPr marL="304165" indent="-304165">
-              <a:lnSpc>
-                <a:spcPct val="150000"/>
-              </a:lnSpc>
-              <a:spcBef>
-                <a:spcPts val="0"/>
-              </a:spcBef>
-            </a:pPr>
-            <a:r>
-              <a:rPr lang="en-US" dirty="0">
+            <a:r>
+              <a:rPr lang="en-US" sz="2400" dirty="0">
                 <a:latin typeface="Calibri Light"/>
                 <a:cs typeface="Calibri Light"/>
               </a:rPr>
               <a:t>Logical </a:t>
             </a:r>
             <a:r>
-              <a:rPr lang="en-US" b="1" dirty="0">
+              <a:rPr lang="en-US" sz="2400" b="1" dirty="0">
                 <a:solidFill>
                   <a:srgbClr val="A83DA3"/>
                 </a:solidFill>
@@ -20030,7 +20014,7 @@
               <a:t>OR </a:t>
             </a:r>
             <a:r>
-              <a:rPr lang="en-US" b="1" dirty="0">
+              <a:rPr lang="en-US" sz="2400" b="1" dirty="0">
                 <a:solidFill>
                   <a:srgbClr val="0070C0"/>
                 </a:solidFill>
@@ -20040,27 +20024,27 @@
               <a:t>||</a:t>
             </a:r>
             <a:r>
-              <a:rPr lang="en-US" dirty="0">
+              <a:rPr lang="en-US" sz="2400" dirty="0">
                 <a:latin typeface="Calibri Light"/>
                 <a:cs typeface="Calibri Light"/>
               </a:rPr>
               <a:t>: Returns first truthy value or last </a:t>
             </a:r>
             <a:r>
-              <a:rPr lang="en-US" dirty="0" err="1">
+              <a:rPr lang="en-US" sz="2400" dirty="0" err="1">
                 <a:latin typeface="Calibri Light"/>
                 <a:cs typeface="Calibri Light"/>
               </a:rPr>
               <a:t>falsy</a:t>
             </a:r>
             <a:r>
-              <a:rPr lang="en-US" dirty="0">
+              <a:rPr lang="en-US" sz="2400" dirty="0">
                 <a:latin typeface="Calibri Light"/>
                 <a:cs typeface="Calibri Light"/>
               </a:rPr>
               <a:t> value</a:t>
             </a:r>
-            <a:endParaRPr lang="en-US">
+            <a:endParaRPr lang="en-US" sz="2400" dirty="0">
               <a:latin typeface="Calibri" panose="020F0502020204030204"/>
               <a:cs typeface="Calibri" panose="020F0502020204030204"/>
             </a:endParaRPr>
@@ -20164,7 +20148,7 @@
         </p:nvSpPr>
         <p:spPr>
           <a:xfrm>
-            <a:off x="8796923" y="2048945"/>
+            <a:off x="8619370" y="1960168"/>
             <a:ext cx="1192307" cy="341632"/>
           </a:xfrm>
           <a:prstGeom prst="rect">
@@ -20235,7 +20219,7 @@
         </p:blipFill>
         <p:spPr>
           <a:xfrm>
-            <a:off x="9549372" y="3009693"/>
+            <a:off x="1734572" y="4083226"/>
             <a:ext cx="2211531" cy="2554331"/>
           </a:xfrm>
           <a:prstGeom prst="rect">
@@ -20257,7 +20241,7 @@
         </p:nvSpPr>
         <p:spPr>
           <a:xfrm>
-            <a:off x="2121171" y="4620285"/>
+            <a:off x="8463706" y="3459600"/>
             <a:ext cx="2899166" cy="507831"/>
           </a:xfrm>
           <a:prstGeom prst="rect">
@@ -20306,7 +20290,7 @@
               </a:rPr>
             </a:br>
             <a:r>
-              <a:rPr lang="en-US" sz="1200" b="1">
+              <a:rPr lang="en-US" sz="1200" b="1" dirty="0">
                 <a:latin typeface="Calibri Light"/>
                 <a:cs typeface="Calibri Light"/>
               </a:rPr>
@@ -20315,6 +20299,42 @@
           </a:p>
         </p:txBody>
       </p:sp>
+      <p:pic>
+        <p:nvPicPr>
+          <p:cNvPr id="6" name="Picture 5" descr="Text&#10;&#10;Description automatically generated">
+            <a:extLst>
+              <a:ext uri="{FF2B5EF4-FFF2-40B4-BE49-F238E27FC236}">
+                <a16:creationId xmlns:a16="http://schemas.microsoft.com/office/drawing/2014/main" id="{39356147-B2CB-4CE7-8820-F0FF0CE600BF}"/>
+              </a:ext>
+            </a:extLst>
+          </p:cNvPr>
+          <p:cNvPicPr>
+            <a:picLocks noChangeAspect="1"/>
+          </p:cNvPicPr>
+          <p:nvPr/>
+        </p:nvPicPr>
+        <p:blipFill>
+          <a:blip r:embed="rId4">
+            <a:extLst>
+              <a:ext uri="{28A0092B-C50C-407E-A947-70E740481C1C}">
+                <a14:useLocalDpi xmlns:a14="http://schemas.microsoft.com/office/drawing/2010/main" val="0"/>
+              </a:ext>
+            </a:extLst>
+          </a:blip>
+          <a:stretch>
+            <a:fillRect/>
+          </a:stretch>
+        </p:blipFill>
+        <p:spPr>
+          <a:xfrm>
+            <a:off x="4545745" y="4082148"/>
+            <a:ext cx="5265932" cy="2632966"/>
+          </a:xfrm>
+          <a:prstGeom prst="rect">
+            <a:avLst/>
+          </a:prstGeom>
+        </p:spPr>
+      </p:pic>
     </p:spTree>
     <p:extLst>
       <p:ext uri="{BB962C8B-B14F-4D97-AF65-F5344CB8AC3E}">
@@ -22092,18 +22112,11 @@
           <a:p>
             <a:pPr marL="304165" indent="-304165"/>
             <a:r>
-              <a:rPr lang="en-US">
-                <a:latin typeface="Calibri Light"/>
-                <a:cs typeface="Calibri Light"/>
-              </a:rPr>
-              <a:t>Conditional statement – evaluates an expression depending on its value, then </a:t>
-            </a:r>
-            <a:r>
               <a:rPr lang="en-US" dirty="0">
                 <a:latin typeface="Calibri Light"/>
                 <a:cs typeface="Calibri Light"/>
               </a:rPr>
-              <a:t>executes one of multiple </a:t>
+              <a:t>Conditional statement – evaluates an expression depending on its value, then executes one of multiple </a:t>
             </a:r>
             <a:r>
               <a:rPr lang="en-US" b="1" dirty="0">
@@ -22126,14 +22139,14 @@
               <a:t> </a:t>
             </a:r>
             <a:r>
-              <a:rPr lang="en-US">
+              <a:rPr lang="en-US" dirty="0">
                 <a:latin typeface="Calibri Light"/>
                 <a:cs typeface="Calibri Light"/>
               </a:rPr>
               <a:t>clauses and an optional </a:t>
             </a:r>
             <a:r>
-              <a:rPr lang="en-US" b="1">
+              <a:rPr lang="en-US" b="1" dirty="0">
                 <a:solidFill>
                   <a:srgbClr val="A83DA3"/>
                 </a:solidFill>
@@ -22143,7 +22156,7 @@
               <a:t>default </a:t>
             </a:r>
             <a:r>
-              <a:rPr lang="en-US">
+              <a:rPr lang="en-US" dirty="0">
                 <a:latin typeface="Calibri Light"/>
                 <a:cs typeface="Calibri Light"/>
               </a:rPr>
@@ -22201,18 +22214,11 @@
               </a:spcBef>
             </a:pPr>
             <a:r>
-              <a:rPr lang="en-US">
-                <a:latin typeface="Calibri Light"/>
-                <a:cs typeface="Calibri Light"/>
-              </a:rPr>
-              <a:t>Once</a:t>
-            </a:r>
-            <a:r>
               <a:rPr lang="en-US" dirty="0">
                 <a:latin typeface="Calibri Light"/>
                 <a:cs typeface="Calibri Light"/>
               </a:rPr>
-              <a:t> the program enters a </a:t>
+              <a:t>Once the program enters a </a:t>
             </a:r>
             <a:r>
               <a:rPr lang="en-US" b="1" dirty="0">
@@ -22229,7 +22235,7 @@
                 <a:latin typeface="Calibri Light"/>
                 <a:cs typeface="Calibri Light"/>
               </a:rPr>
-              <a:t>, it will executing all following statements until it reaches the end of the switch block, or a </a:t>
+              <a:t>, it will execute all following statements until it reaches the end of the switch block, or a </a:t>
             </a:r>
             <a:r>
               <a:rPr lang="en-US" b="1" dirty="0">
@@ -22300,7 +22306,7 @@
               </a:rPr>
               <a:t>unless you know what you're doing and you want that behavior. </a:t>
             </a:r>
-            <a:endParaRPr lang="en-US">
+            <a:endParaRPr lang="en-US" dirty="0">
               <a:cs typeface="Calibri" panose="020F0502020204030204"/>
             </a:endParaRPr>
           </a:p>
@@ -22337,7 +22343,7 @@
               </a:rPr>
               <a:t>clause is like the "else" in an if statement, will run if nothing else matches, best practice is to always use it </a:t>
             </a:r>
-            <a:endParaRPr lang="en-US">
+            <a:endParaRPr lang="en-US" dirty="0">
               <a:cs typeface="Calibri" panose="020F0502020204030204"/>
             </a:endParaRPr>
           </a:p>
@@ -23241,530 +23247,6 @@
         <p:spPr>
           <a:xfrm>
             <a:off x="1098395" y="123515"/>
-            <a:ext cx="10515600" cy="1093246"/>
-          </a:xfrm>
-        </p:spPr>
-        <p:txBody>
-          <a:bodyPr/>
-          <a:lstStyle/>
-          <a:p>
-            <a:r>
-              <a:rPr lang="en-US">
-                <a:solidFill>
-                  <a:schemeClr val="accent5"/>
-                </a:solidFill>
-                <a:latin typeface="Calibri"/>
-                <a:cs typeface="Calibri"/>
-              </a:rPr>
-              <a:t>While Loops</a:t>
-            </a:r>
-            <a:endParaRPr lang="en-US"/>
-          </a:p>
-        </p:txBody>
-      </p:sp>
-      <p:sp>
-        <p:nvSpPr>
-          <p:cNvPr id="3" name="Content Placeholder 2">
-            <a:extLst>
-              <a:ext uri="{FF2B5EF4-FFF2-40B4-BE49-F238E27FC236}">
-                <a16:creationId xmlns:a16="http://schemas.microsoft.com/office/drawing/2014/main" id="{AA884387-B0CF-45D3-8BD7-0DA176A27965}"/>
-              </a:ext>
-            </a:extLst>
-          </p:cNvPr>
-          <p:cNvSpPr>
-            <a:spLocks noGrp="1"/>
-          </p:cNvSpPr>
-          <p:nvPr>
-            <p:ph idx="1"/>
-          </p:nvPr>
-        </p:nvSpPr>
-        <p:spPr>
-          <a:xfrm>
-            <a:off x="1188239" y="1643384"/>
-            <a:ext cx="10687956" cy="4562707"/>
-          </a:xfrm>
-        </p:spPr>
-        <p:txBody>
-          <a:bodyPr vert="horz" lIns="121899" tIns="60949" rIns="121899" bIns="60949" rtlCol="0" anchor="t">
-            <a:normAutofit/>
-          </a:bodyPr>
-          <a:lstStyle/>
-          <a:p>
-            <a:pPr marL="304165" indent="-304165"/>
-            <a:r>
-              <a:rPr lang="en-US">
-                <a:latin typeface="Calibri Light"/>
-                <a:cs typeface="Calibri Light"/>
-              </a:rPr>
-              <a:t>Repeat a block of code until a condition evaluates as false</a:t>
-            </a:r>
-          </a:p>
-          <a:p>
-            <a:pPr marL="304165" indent="-304165"/>
-            <a:endParaRPr lang="en-US">
-              <a:latin typeface="Calibri Light"/>
-              <a:cs typeface="Calibri Light"/>
-            </a:endParaRPr>
-          </a:p>
-        </p:txBody>
-      </p:sp>
-      <p:pic>
-        <p:nvPicPr>
-          <p:cNvPr id="4" name="Picture 4" descr="A screen shot of a computer&#10;&#10;Description generated with very high confidence">
-            <a:extLst>
-              <a:ext uri="{FF2B5EF4-FFF2-40B4-BE49-F238E27FC236}">
-                <a16:creationId xmlns:a16="http://schemas.microsoft.com/office/drawing/2014/main" id="{7D5B80CF-703F-4B7C-84CF-7827462DB3AB}"/>
-              </a:ext>
-            </a:extLst>
-          </p:cNvPr>
-          <p:cNvPicPr>
-            <a:picLocks noChangeAspect="1"/>
-          </p:cNvPicPr>
-          <p:nvPr/>
-        </p:nvPicPr>
-        <p:blipFill rotWithShape="1">
-          <a:blip r:embed="rId2"/>
-          <a:srcRect l="-1908" t="-2" r="1527" b="56863"/>
-          <a:stretch/>
-        </p:blipFill>
-        <p:spPr>
-          <a:xfrm>
-            <a:off x="1191044" y="2381852"/>
-            <a:ext cx="2412266" cy="1021652"/>
-          </a:xfrm>
-          <a:prstGeom prst="rect">
-            <a:avLst/>
-          </a:prstGeom>
-        </p:spPr>
-      </p:pic>
-      <p:pic>
-        <p:nvPicPr>
-          <p:cNvPr id="6" name="Picture 6" descr="A picture containing vector graphics&#10;&#10;Description generated with very high confidence">
-            <a:extLst>
-              <a:ext uri="{FF2B5EF4-FFF2-40B4-BE49-F238E27FC236}">
-                <a16:creationId xmlns:a16="http://schemas.microsoft.com/office/drawing/2014/main" id="{2C474B64-D5AE-4300-A41C-FFA4C14B9CBD}"/>
-              </a:ext>
-            </a:extLst>
-          </p:cNvPr>
-          <p:cNvPicPr>
-            <a:picLocks noChangeAspect="1"/>
-          </p:cNvPicPr>
-          <p:nvPr/>
-        </p:nvPicPr>
-        <p:blipFill>
-          <a:blip r:embed="rId3"/>
-          <a:stretch>
-            <a:fillRect/>
-          </a:stretch>
-        </p:blipFill>
-        <p:spPr>
-          <a:xfrm>
-            <a:off x="78954" y="126058"/>
-            <a:ext cx="1017225" cy="1097450"/>
-          </a:xfrm>
-          <a:prstGeom prst="rect">
-            <a:avLst/>
-          </a:prstGeom>
-        </p:spPr>
-      </p:pic>
-      <p:pic>
-        <p:nvPicPr>
-          <p:cNvPr id="5" name="Picture 6" descr="A close up of a screen&#10;&#10;Description automatically generated">
-            <a:extLst>
-              <a:ext uri="{FF2B5EF4-FFF2-40B4-BE49-F238E27FC236}">
-                <a16:creationId xmlns:a16="http://schemas.microsoft.com/office/drawing/2014/main" id="{9090F0DA-2890-49E6-9B7A-37F3981CC8C7}"/>
-              </a:ext>
-            </a:extLst>
-          </p:cNvPr>
-          <p:cNvPicPr>
-            <a:picLocks noChangeAspect="1"/>
-          </p:cNvPicPr>
-          <p:nvPr/>
-        </p:nvPicPr>
-        <p:blipFill>
-          <a:blip r:embed="rId4"/>
-          <a:stretch>
-            <a:fillRect/>
-          </a:stretch>
-        </p:blipFill>
-        <p:spPr>
-          <a:xfrm>
-            <a:off x="3682445" y="2381852"/>
-            <a:ext cx="2218819" cy="1018970"/>
-          </a:xfrm>
-          <a:prstGeom prst="rect">
-            <a:avLst/>
-          </a:prstGeom>
-        </p:spPr>
-      </p:pic>
-      <p:pic>
-        <p:nvPicPr>
-          <p:cNvPr id="8" name="Picture 8" descr="A close up of a screen&#10;&#10;Description automatically generated">
-            <a:extLst>
-              <a:ext uri="{FF2B5EF4-FFF2-40B4-BE49-F238E27FC236}">
-                <a16:creationId xmlns:a16="http://schemas.microsoft.com/office/drawing/2014/main" id="{7FAAD29D-B742-4995-BBD3-075D2CA1542D}"/>
-              </a:ext>
-            </a:extLst>
-          </p:cNvPr>
-          <p:cNvPicPr>
-            <a:picLocks noChangeAspect="1"/>
-          </p:cNvPicPr>
-          <p:nvPr/>
-        </p:nvPicPr>
-        <p:blipFill>
-          <a:blip r:embed="rId5"/>
-          <a:stretch>
-            <a:fillRect/>
-          </a:stretch>
-        </p:blipFill>
-        <p:spPr>
-          <a:xfrm>
-            <a:off x="6001973" y="2382357"/>
-            <a:ext cx="2102238" cy="1022660"/>
-          </a:xfrm>
-          <a:prstGeom prst="rect">
-            <a:avLst/>
-          </a:prstGeom>
-        </p:spPr>
-      </p:pic>
-      <p:pic>
-        <p:nvPicPr>
-          <p:cNvPr id="11" name="Picture 11" descr="A picture containing meter&#10;&#10;Description automatically generated">
-            <a:extLst>
-              <a:ext uri="{FF2B5EF4-FFF2-40B4-BE49-F238E27FC236}">
-                <a16:creationId xmlns:a16="http://schemas.microsoft.com/office/drawing/2014/main" id="{1CC78CB0-024C-4F5E-B3D9-B8920A56741F}"/>
-              </a:ext>
-            </a:extLst>
-          </p:cNvPr>
-          <p:cNvPicPr>
-            <a:picLocks noChangeAspect="1"/>
-          </p:cNvPicPr>
-          <p:nvPr/>
-        </p:nvPicPr>
-        <p:blipFill rotWithShape="1">
-          <a:blip r:embed="rId6"/>
-          <a:srcRect t="179" r="389" b="6195"/>
-          <a:stretch/>
-        </p:blipFill>
-        <p:spPr>
-          <a:xfrm>
-            <a:off x="8352961" y="2316803"/>
-            <a:ext cx="2845911" cy="1203620"/>
-          </a:xfrm>
-          <a:prstGeom prst="rect">
-            <a:avLst/>
-          </a:prstGeom>
-          <a:ln w="28575">
-            <a:solidFill>
-              <a:srgbClr val="4472C4"/>
-            </a:solidFill>
-          </a:ln>
-        </p:spPr>
-      </p:pic>
-      <p:pic>
-        <p:nvPicPr>
-          <p:cNvPr id="12" name="Picture 12" descr="A picture containing clock&#10;&#10;Description automatically generated">
-            <a:extLst>
-              <a:ext uri="{FF2B5EF4-FFF2-40B4-BE49-F238E27FC236}">
-                <a16:creationId xmlns:a16="http://schemas.microsoft.com/office/drawing/2014/main" id="{A44821B6-6FE5-4450-8E2B-8F7B9C89B596}"/>
-              </a:ext>
-            </a:extLst>
-          </p:cNvPr>
-          <p:cNvPicPr>
-            <a:picLocks noChangeAspect="1"/>
-          </p:cNvPicPr>
-          <p:nvPr/>
-        </p:nvPicPr>
-        <p:blipFill>
-          <a:blip r:embed="rId7"/>
-          <a:stretch>
-            <a:fillRect/>
-          </a:stretch>
-        </p:blipFill>
-        <p:spPr>
-          <a:xfrm>
-            <a:off x="1825083" y="4505177"/>
-            <a:ext cx="5317273" cy="1081499"/>
-          </a:xfrm>
-          <a:prstGeom prst="rect">
-            <a:avLst/>
-          </a:prstGeom>
-        </p:spPr>
-      </p:pic>
-      <p:pic>
-        <p:nvPicPr>
-          <p:cNvPr id="14" name="Picture 14" descr="A screenshot of a cell phone&#10;&#10;Description automatically generated">
-            <a:extLst>
-              <a:ext uri="{FF2B5EF4-FFF2-40B4-BE49-F238E27FC236}">
-                <a16:creationId xmlns:a16="http://schemas.microsoft.com/office/drawing/2014/main" id="{803EB615-5E59-4FB2-A402-A4507E0905AE}"/>
-              </a:ext>
-            </a:extLst>
-          </p:cNvPr>
-          <p:cNvPicPr>
-            <a:picLocks noChangeAspect="1"/>
-          </p:cNvPicPr>
-          <p:nvPr/>
-        </p:nvPicPr>
-        <p:blipFill>
-          <a:blip r:embed="rId8"/>
-          <a:stretch>
-            <a:fillRect/>
-          </a:stretch>
-        </p:blipFill>
-        <p:spPr>
-          <a:xfrm>
-            <a:off x="7744522" y="4500706"/>
-            <a:ext cx="3319346" cy="1071855"/>
-          </a:xfrm>
-          <a:prstGeom prst="rect">
-            <a:avLst/>
-          </a:prstGeom>
-          <a:ln w="28575">
-            <a:solidFill>
-              <a:srgbClr val="4472C4"/>
-            </a:solidFill>
-          </a:ln>
-        </p:spPr>
-      </p:pic>
-    </p:spTree>
-    <p:extLst>
-      <p:ext uri="{BB962C8B-B14F-4D97-AF65-F5344CB8AC3E}">
-        <p14:creationId xmlns:p14="http://schemas.microsoft.com/office/powerpoint/2010/main" val="915009128"/>
-      </p:ext>
-    </p:extLst>
-  </p:cSld>
-  <p:clrMapOvr>
-    <a:masterClrMapping/>
-  </p:clrMapOvr>
-</p:sld>
-</file>
-
-<file path=ppt/slides/slide24.xml><?xml version="1.0" encoding="utf-8"?>
-<p:sld xmlns:a="http://schemas.openxmlformats.org/drawingml/2006/main" xmlns:r="http://schemas.openxmlformats.org/officeDocument/2006/relationships" xmlns:p="http://schemas.openxmlformats.org/presentationml/2006/main">
-  <p:cSld>
-    <p:spTree>
-      <p:nvGrpSpPr>
-        <p:cNvPr id="1" name=""/>
-        <p:cNvGrpSpPr/>
-        <p:nvPr/>
-      </p:nvGrpSpPr>
-      <p:grpSpPr>
-        <a:xfrm>
-          <a:off x="0" y="0"/>
-          <a:ext cx="0" cy="0"/>
-          <a:chOff x="0" y="0"/>
-          <a:chExt cx="0" cy="0"/>
-        </a:xfrm>
-      </p:grpSpPr>
-      <p:sp>
-        <p:nvSpPr>
-          <p:cNvPr id="2" name="Title 1">
-            <a:extLst>
-              <a:ext uri="{FF2B5EF4-FFF2-40B4-BE49-F238E27FC236}">
-                <a16:creationId xmlns:a16="http://schemas.microsoft.com/office/drawing/2014/main" id="{5B5D241C-05D2-42F5-938A-2785456A615B}"/>
-              </a:ext>
-            </a:extLst>
-          </p:cNvPr>
-          <p:cNvSpPr>
-            <a:spLocks noGrp="1"/>
-          </p:cNvSpPr>
-          <p:nvPr>
-            <p:ph type="title"/>
-          </p:nvPr>
-        </p:nvSpPr>
-        <p:spPr>
-          <a:xfrm>
-            <a:off x="1098395" y="123515"/>
-            <a:ext cx="10515600" cy="1241929"/>
-          </a:xfrm>
-        </p:spPr>
-        <p:txBody>
-          <a:bodyPr/>
-          <a:lstStyle/>
-          <a:p>
-            <a:r>
-              <a:rPr lang="en-US">
-                <a:solidFill>
-                  <a:schemeClr val="accent5"/>
-                </a:solidFill>
-                <a:latin typeface="Calibri"/>
-                <a:cs typeface="Calibri"/>
-              </a:rPr>
-              <a:t>Do … While Loops</a:t>
-            </a:r>
-            <a:endParaRPr lang="en-US">
-              <a:solidFill>
-                <a:schemeClr val="accent5"/>
-              </a:solidFill>
-            </a:endParaRPr>
-          </a:p>
-        </p:txBody>
-      </p:sp>
-      <p:sp>
-        <p:nvSpPr>
-          <p:cNvPr id="3" name="Content Placeholder 2">
-            <a:extLst>
-              <a:ext uri="{FF2B5EF4-FFF2-40B4-BE49-F238E27FC236}">
-                <a16:creationId xmlns:a16="http://schemas.microsoft.com/office/drawing/2014/main" id="{AA884387-B0CF-45D3-8BD7-0DA176A27965}"/>
-              </a:ext>
-            </a:extLst>
-          </p:cNvPr>
-          <p:cNvSpPr>
-            <a:spLocks noGrp="1"/>
-          </p:cNvSpPr>
-          <p:nvPr>
-            <p:ph idx="1"/>
-          </p:nvPr>
-        </p:nvSpPr>
-        <p:spPr>
-          <a:xfrm>
-            <a:off x="829128" y="1765634"/>
-            <a:ext cx="10687956" cy="4553414"/>
-          </a:xfrm>
-        </p:spPr>
-        <p:txBody>
-          <a:bodyPr vert="horz" lIns="121899" tIns="60949" rIns="121899" bIns="60949" rtlCol="0" anchor="t">
-            <a:normAutofit/>
-          </a:bodyPr>
-          <a:lstStyle/>
-          <a:p>
-            <a:pPr marL="304165" indent="-304165"/>
-            <a:r>
-              <a:rPr lang="en-US">
-                <a:latin typeface="Calibri Light"/>
-                <a:cs typeface="Calibri Light"/>
-              </a:rPr>
-              <a:t>Variant of while loops where the code block always executes at least once, even if the while condition is false</a:t>
-            </a:r>
-            <a:endParaRPr lang="en-US"/>
-          </a:p>
-          <a:p>
-            <a:pPr marL="0" indent="0">
-              <a:buNone/>
-            </a:pPr>
-            <a:endParaRPr lang="en-US">
-              <a:latin typeface="Calibri Light"/>
-              <a:cs typeface="Calibri Light"/>
-            </a:endParaRPr>
-          </a:p>
-          <a:p>
-            <a:pPr marL="304165" indent="-304165"/>
-            <a:endParaRPr lang="en-US">
-              <a:latin typeface="Calibri Light"/>
-              <a:cs typeface="Calibri Light"/>
-            </a:endParaRPr>
-          </a:p>
-        </p:txBody>
-      </p:sp>
-      <p:pic>
-        <p:nvPicPr>
-          <p:cNvPr id="4" name="Picture 4" descr="A screenshot of a cell phone&#10;&#10;Description generated with very high confidence">
-            <a:extLst>
-              <a:ext uri="{FF2B5EF4-FFF2-40B4-BE49-F238E27FC236}">
-                <a16:creationId xmlns:a16="http://schemas.microsoft.com/office/drawing/2014/main" id="{30F597C5-8031-4BC1-A4C7-2967206A2326}"/>
-              </a:ext>
-            </a:extLst>
-          </p:cNvPr>
-          <p:cNvPicPr>
-            <a:picLocks noChangeAspect="1"/>
-          </p:cNvPicPr>
-          <p:nvPr/>
-        </p:nvPicPr>
-        <p:blipFill>
-          <a:blip r:embed="rId2"/>
-          <a:stretch>
-            <a:fillRect/>
-          </a:stretch>
-        </p:blipFill>
-        <p:spPr>
-          <a:xfrm>
-            <a:off x="2266383" y="2881149"/>
-            <a:ext cx="7713132" cy="3325736"/>
-          </a:xfrm>
-          <a:prstGeom prst="rect">
-            <a:avLst/>
-          </a:prstGeom>
-        </p:spPr>
-      </p:pic>
-      <p:pic>
-        <p:nvPicPr>
-          <p:cNvPr id="6" name="Picture 6" descr="A picture containing vector graphics&#10;&#10;Description generated with very high confidence">
-            <a:extLst>
-              <a:ext uri="{FF2B5EF4-FFF2-40B4-BE49-F238E27FC236}">
-                <a16:creationId xmlns:a16="http://schemas.microsoft.com/office/drawing/2014/main" id="{825B6447-58D1-41DB-A7E9-A2DFEF64E2DD}"/>
-              </a:ext>
-            </a:extLst>
-          </p:cNvPr>
-          <p:cNvPicPr>
-            <a:picLocks noChangeAspect="1"/>
-          </p:cNvPicPr>
-          <p:nvPr/>
-        </p:nvPicPr>
-        <p:blipFill>
-          <a:blip r:embed="rId3"/>
-          <a:stretch>
-            <a:fillRect/>
-          </a:stretch>
-        </p:blipFill>
-        <p:spPr>
-          <a:xfrm>
-            <a:off x="78954" y="126058"/>
-            <a:ext cx="1017225" cy="1097450"/>
-          </a:xfrm>
-          <a:prstGeom prst="rect">
-            <a:avLst/>
-          </a:prstGeom>
-        </p:spPr>
-      </p:pic>
-    </p:spTree>
-    <p:extLst>
-      <p:ext uri="{BB962C8B-B14F-4D97-AF65-F5344CB8AC3E}">
-        <p14:creationId xmlns:p14="http://schemas.microsoft.com/office/powerpoint/2010/main" val="3694446240"/>
-      </p:ext>
-    </p:extLst>
-  </p:cSld>
-  <p:clrMapOvr>
-    <a:masterClrMapping/>
-  </p:clrMapOvr>
-</p:sld>
-</file>
-
-<file path=ppt/slides/slide25.xml><?xml version="1.0" encoding="utf-8"?>
-<p:sld xmlns:a="http://schemas.openxmlformats.org/drawingml/2006/main" xmlns:r="http://schemas.openxmlformats.org/officeDocument/2006/relationships" xmlns:p="http://schemas.openxmlformats.org/presentationml/2006/main">
-  <p:cSld>
-    <p:spTree>
-      <p:nvGrpSpPr>
-        <p:cNvPr id="1" name=""/>
-        <p:cNvGrpSpPr/>
-        <p:nvPr/>
-      </p:nvGrpSpPr>
-      <p:grpSpPr>
-        <a:xfrm>
-          <a:off x="0" y="0"/>
-          <a:ext cx="0" cy="0"/>
-          <a:chOff x="0" y="0"/>
-          <a:chExt cx="0" cy="0"/>
-        </a:xfrm>
-      </p:grpSpPr>
-      <p:sp>
-        <p:nvSpPr>
-          <p:cNvPr id="2" name="Title 1">
-            <a:extLst>
-              <a:ext uri="{FF2B5EF4-FFF2-40B4-BE49-F238E27FC236}">
-                <a16:creationId xmlns:a16="http://schemas.microsoft.com/office/drawing/2014/main" id="{5B5D241C-05D2-42F5-938A-2785456A615B}"/>
-              </a:ext>
-            </a:extLst>
-          </p:cNvPr>
-          <p:cNvSpPr>
-            <a:spLocks noGrp="1"/>
-          </p:cNvSpPr>
-          <p:nvPr>
-            <p:ph type="title"/>
-          </p:nvPr>
-        </p:nvSpPr>
-        <p:spPr>
-          <a:xfrm>
-            <a:off x="1098395" y="123515"/>
             <a:ext cx="10515600" cy="1241929"/>
           </a:xfrm>
         </p:spPr>
@@ -24397,7 +23879,7 @@
 </p:sld>
 </file>
 
-<file path=ppt/slides/slide26.xml><?xml version="1.0" encoding="utf-8"?>
+<file path=ppt/slides/slide24.xml><?xml version="1.0" encoding="utf-8"?>
 <p:sld xmlns:a="http://schemas.openxmlformats.org/drawingml/2006/main" xmlns:r="http://schemas.openxmlformats.org/officeDocument/2006/relationships" xmlns:p="http://schemas.openxmlformats.org/presentationml/2006/main">
   <p:cSld>
     <p:spTree>
@@ -24433,24 +23915,26 @@
         <p:spPr>
           <a:xfrm>
             <a:off x="1098395" y="123515"/>
-            <a:ext cx="10515600" cy="1241929"/>
+            <a:ext cx="10515600" cy="1093246"/>
           </a:xfrm>
         </p:spPr>
         <p:txBody>
-          <a:bodyPr/>
+          <a:bodyPr>
+            <a:normAutofit/>
+          </a:bodyPr>
           <a:lstStyle/>
           <a:p>
             <a:r>
-              <a:rPr lang="en-US">
+              <a:rPr lang="en-US" sz="4000" dirty="0">
                 <a:solidFill>
                   <a:schemeClr val="accent5"/>
                 </a:solidFill>
                 <a:latin typeface="Calibri"/>
                 <a:cs typeface="Calibri"/>
               </a:rPr>
-              <a:t>Array Methods</a:t>
-            </a:r>
-            <a:endParaRPr lang="en-US">
+              <a:t>Array Methods – push(), pop(), unshift(), shift()</a:t>
+            </a:r>
+            <a:endParaRPr lang="en-US" sz="4000" dirty="0">
               <a:solidFill>
                 <a:schemeClr val="accent5"/>
               </a:solidFill>
@@ -24476,253 +23960,6 @@
         </p:nvSpPr>
         <p:spPr>
           <a:xfrm>
-            <a:off x="829128" y="1751641"/>
-            <a:ext cx="10687956" cy="4567407"/>
-          </a:xfrm>
-        </p:spPr>
-        <p:txBody>
-          <a:bodyPr vert="horz" lIns="121899" tIns="60949" rIns="121899" bIns="60949" rtlCol="0" anchor="t">
-            <a:normAutofit lnSpcReduction="10000"/>
-          </a:bodyPr>
-          <a:lstStyle/>
-          <a:p>
-            <a:pPr marL="304165" indent="-304165"/>
-            <a:r>
-              <a:rPr lang="en-US">
-                <a:latin typeface="Calibri Light"/>
-                <a:cs typeface="Calibri Light"/>
-              </a:rPr>
-              <a:t>Some are mutator methods – they change the array</a:t>
-            </a:r>
-            <a:endParaRPr lang="en-US" dirty="0"/>
-          </a:p>
-          <a:p>
-            <a:pPr marL="304165" indent="-304165"/>
-            <a:endParaRPr lang="en-US" dirty="0">
-              <a:latin typeface="Calibri Light"/>
-              <a:cs typeface="Calibri Light"/>
-            </a:endParaRPr>
-          </a:p>
-          <a:p>
-            <a:pPr marL="304165" indent="-304165"/>
-            <a:r>
-              <a:rPr lang="en-US" dirty="0">
-                <a:latin typeface="Calibri Light"/>
-                <a:cs typeface="Calibri Light"/>
-              </a:rPr>
-              <a:t>Others are not – only access the array</a:t>
-            </a:r>
-            <a:endParaRPr lang="en-US" dirty="0"/>
-          </a:p>
-          <a:p>
-            <a:pPr marL="304165" indent="-304165"/>
-            <a:endParaRPr lang="en-US" dirty="0">
-              <a:latin typeface="Calibri Light"/>
-              <a:cs typeface="Calibri Light"/>
-            </a:endParaRPr>
-          </a:p>
-          <a:p>
-            <a:pPr marL="304165" indent="-304165"/>
-            <a:r>
-              <a:rPr lang="en-US" dirty="0">
-                <a:latin typeface="Calibri Light"/>
-                <a:cs typeface="Calibri Light"/>
-              </a:rPr>
-              <a:t>Some have parameters, others don't</a:t>
-            </a:r>
-          </a:p>
-          <a:p>
-            <a:pPr marL="304165" indent="-304165"/>
-            <a:endParaRPr lang="en-US" dirty="0">
-              <a:latin typeface="Calibri Light"/>
-              <a:cs typeface="Calibri Light"/>
-            </a:endParaRPr>
-          </a:p>
-          <a:p>
-            <a:pPr marL="304165" indent="-304165"/>
-            <a:r>
-              <a:rPr lang="en-US" dirty="0">
-                <a:latin typeface="Calibri Light"/>
-                <a:cs typeface="Calibri Light"/>
-              </a:rPr>
-              <a:t>Most will return some value, different for each method</a:t>
-            </a:r>
-            <a:endParaRPr lang="en-US" dirty="0"/>
-          </a:p>
-          <a:p>
-            <a:pPr marL="304165" indent="-304165"/>
-            <a:endParaRPr lang="en-US" dirty="0">
-              <a:latin typeface="Calibri Light"/>
-              <a:cs typeface="Calibri Light"/>
-            </a:endParaRPr>
-          </a:p>
-          <a:p>
-            <a:pPr marL="304165" indent="-304165"/>
-            <a:r>
-              <a:rPr lang="en-US" dirty="0">
-                <a:latin typeface="Calibri Light"/>
-                <a:cs typeface="Calibri Light"/>
-              </a:rPr>
-              <a:t>Very useful – there are many, it will take time to learn them all</a:t>
-            </a:r>
-            <a:endParaRPr lang="en-US" dirty="0"/>
-          </a:p>
-          <a:p>
-            <a:pPr marL="304165" indent="-304165"/>
-            <a:endParaRPr lang="en-US">
-              <a:latin typeface="Calibri Light"/>
-              <a:cs typeface="Calibri Light"/>
-            </a:endParaRPr>
-          </a:p>
-          <a:p>
-            <a:pPr marL="0" indent="0">
-              <a:buNone/>
-            </a:pPr>
-            <a:endParaRPr lang="en-US">
-              <a:latin typeface="Calibri Light"/>
-              <a:cs typeface="Calibri Light"/>
-            </a:endParaRPr>
-          </a:p>
-          <a:p>
-            <a:pPr marL="304165" indent="-304165"/>
-            <a:endParaRPr lang="en-US">
-              <a:latin typeface="Calibri Light"/>
-              <a:cs typeface="Calibri Light"/>
-            </a:endParaRPr>
-          </a:p>
-          <a:p>
-            <a:pPr marL="304165" indent="-304165"/>
-            <a:endParaRPr lang="en-US">
-              <a:latin typeface="Calibri Light"/>
-              <a:cs typeface="Calibri Light"/>
-            </a:endParaRPr>
-          </a:p>
-        </p:txBody>
-      </p:sp>
-      <p:pic>
-        <p:nvPicPr>
-          <p:cNvPr id="5" name="Picture 6" descr="A picture containing vector graphics&#10;&#10;Description generated with very high confidence">
-            <a:extLst>
-              <a:ext uri="{FF2B5EF4-FFF2-40B4-BE49-F238E27FC236}">
-                <a16:creationId xmlns:a16="http://schemas.microsoft.com/office/drawing/2014/main" id="{42FA8E74-8860-49C3-A423-6EFE215F5148}"/>
-              </a:ext>
-            </a:extLst>
-          </p:cNvPr>
-          <p:cNvPicPr>
-            <a:picLocks noChangeAspect="1"/>
-          </p:cNvPicPr>
-          <p:nvPr/>
-        </p:nvPicPr>
-        <p:blipFill>
-          <a:blip r:embed="rId2"/>
-          <a:stretch>
-            <a:fillRect/>
-          </a:stretch>
-        </p:blipFill>
-        <p:spPr>
-          <a:xfrm>
-            <a:off x="78954" y="126058"/>
-            <a:ext cx="1017225" cy="1097450"/>
-          </a:xfrm>
-          <a:prstGeom prst="rect">
-            <a:avLst/>
-          </a:prstGeom>
-        </p:spPr>
-      </p:pic>
-    </p:spTree>
-    <p:extLst>
-      <p:ext uri="{BB962C8B-B14F-4D97-AF65-F5344CB8AC3E}">
-        <p14:creationId xmlns:p14="http://schemas.microsoft.com/office/powerpoint/2010/main" val="2581581915"/>
-      </p:ext>
-    </p:extLst>
-  </p:cSld>
-  <p:clrMapOvr>
-    <a:masterClrMapping/>
-  </p:clrMapOvr>
-</p:sld>
-</file>
-
-<file path=ppt/slides/slide27.xml><?xml version="1.0" encoding="utf-8"?>
-<p:sld xmlns:a="http://schemas.openxmlformats.org/drawingml/2006/main" xmlns:r="http://schemas.openxmlformats.org/officeDocument/2006/relationships" xmlns:p="http://schemas.openxmlformats.org/presentationml/2006/main">
-  <p:cSld>
-    <p:spTree>
-      <p:nvGrpSpPr>
-        <p:cNvPr id="1" name=""/>
-        <p:cNvGrpSpPr/>
-        <p:nvPr/>
-      </p:nvGrpSpPr>
-      <p:grpSpPr>
-        <a:xfrm>
-          <a:off x="0" y="0"/>
-          <a:ext cx="0" cy="0"/>
-          <a:chOff x="0" y="0"/>
-          <a:chExt cx="0" cy="0"/>
-        </a:xfrm>
-      </p:grpSpPr>
-      <p:sp>
-        <p:nvSpPr>
-          <p:cNvPr id="2" name="Title 1">
-            <a:extLst>
-              <a:ext uri="{FF2B5EF4-FFF2-40B4-BE49-F238E27FC236}">
-                <a16:creationId xmlns:a16="http://schemas.microsoft.com/office/drawing/2014/main" id="{5B5D241C-05D2-42F5-938A-2785456A615B}"/>
-              </a:ext>
-            </a:extLst>
-          </p:cNvPr>
-          <p:cNvSpPr>
-            <a:spLocks noGrp="1"/>
-          </p:cNvSpPr>
-          <p:nvPr>
-            <p:ph type="title"/>
-          </p:nvPr>
-        </p:nvSpPr>
-        <p:spPr>
-          <a:xfrm>
-            <a:off x="1098395" y="123515"/>
-            <a:ext cx="10515600" cy="1093246"/>
-          </a:xfrm>
-        </p:spPr>
-        <p:txBody>
-          <a:bodyPr>
-            <a:normAutofit/>
-          </a:bodyPr>
-          <a:lstStyle/>
-          <a:p>
-            <a:r>
-              <a:rPr lang="en-US" sz="4000" dirty="0">
-                <a:solidFill>
-                  <a:schemeClr val="accent5"/>
-                </a:solidFill>
-                <a:latin typeface="Calibri"/>
-                <a:cs typeface="Calibri"/>
-              </a:rPr>
-              <a:t>Array Methods – push(), pop(), unshift(), shift()</a:t>
-            </a:r>
-            <a:endParaRPr lang="en-US" sz="4000" dirty="0">
-              <a:solidFill>
-                <a:schemeClr val="accent5"/>
-              </a:solidFill>
-            </a:endParaRPr>
-          </a:p>
-        </p:txBody>
-      </p:sp>
-      <p:sp>
-        <p:nvSpPr>
-          <p:cNvPr id="3" name="Content Placeholder 2">
-            <a:extLst>
-              <a:ext uri="{FF2B5EF4-FFF2-40B4-BE49-F238E27FC236}">
-                <a16:creationId xmlns:a16="http://schemas.microsoft.com/office/drawing/2014/main" id="{AA884387-B0CF-45D3-8BD7-0DA176A27965}"/>
-              </a:ext>
-            </a:extLst>
-          </p:cNvPr>
-          <p:cNvSpPr>
-            <a:spLocks noGrp="1"/>
-          </p:cNvSpPr>
-          <p:nvPr>
-            <p:ph idx="1"/>
-          </p:nvPr>
-        </p:nvSpPr>
-        <p:spPr>
-          <a:xfrm>
             <a:off x="802561" y="1413716"/>
             <a:ext cx="10678664" cy="4740140"/>
           </a:xfrm>
@@ -24886,7 +24123,7 @@
               </a:rPr>
               <a:t>, returns new array length</a:t>
             </a:r>
-            <a:endParaRPr lang="en-US"/>
+            <a:endParaRPr lang="en-US" dirty="0"/>
           </a:p>
           <a:p>
             <a:pPr marL="755650" lvl="1" indent="-304165"/>
@@ -24950,7 +24187,7 @@
               </a:rPr>
               <a:t>, returns removed item</a:t>
             </a:r>
-            <a:endParaRPr lang="en-US"/>
+            <a:endParaRPr lang="en-US" dirty="0"/>
           </a:p>
           <a:p>
             <a:pPr marL="755650" lvl="1" indent="-304165"/>
@@ -24990,9 +24227,9 @@
                 <a:latin typeface="Calibri Light"/>
                 <a:cs typeface="Calibri Light"/>
               </a:rPr>
-              <a:t>methods</a:t>
-            </a:r>
-            <a:endParaRPr lang="en-US"/>
+              <a:t>methods (mutate the original array)</a:t>
+            </a:r>
+            <a:endParaRPr lang="en-US" dirty="0"/>
           </a:p>
           <a:p>
             <a:pPr marL="0" indent="0">
@@ -25449,7 +24686,7 @@
 </p:sld>
 </file>
 
-<file path=ppt/slides/slide28.xml><?xml version="1.0" encoding="utf-8"?>
+<file path=ppt/slides/slide25.xml><?xml version="1.0" encoding="utf-8"?>
 <p:sld xmlns:a="http://schemas.openxmlformats.org/drawingml/2006/main" xmlns:r="http://schemas.openxmlformats.org/officeDocument/2006/relationships" xmlns:p="http://schemas.openxmlformats.org/presentationml/2006/main">
   <p:cSld>
     <p:spTree>
@@ -25581,16 +24818,9 @@
                 <a:latin typeface="Calibri Light"/>
                 <a:cs typeface="Calibri Light"/>
               </a:rPr>
-              <a:t>Does not mutate the original array – the array fruits will still be the same after you use join() on </a:t>
-            </a:r>
-            <a:r>
-              <a:rPr lang="en-US" sz="2000">
-                <a:latin typeface="Calibri Light"/>
-                <a:cs typeface="Calibri Light"/>
-              </a:rPr>
-              <a:t>it</a:t>
-            </a:r>
-            <a:endParaRPr lang="en-US" sz="2000">
+              <a:t>Does not mutate the original array – the array fruits will still be the same after you use join() on it</a:t>
+            </a:r>
+            <a:endParaRPr lang="en-US" sz="2000" dirty="0">
               <a:cs typeface="Calibri"/>
             </a:endParaRPr>
           </a:p>
@@ -26026,7 +25256,7 @@
 </p:sld>
 </file>
 
-<file path=ppt/slides/slide29.xml><?xml version="1.0" encoding="utf-8"?>
+<file path=ppt/slides/slide26.xml><?xml version="1.0" encoding="utf-8"?>
 <p:sld xmlns:a="http://schemas.openxmlformats.org/drawingml/2006/main" xmlns:r="http://schemas.openxmlformats.org/officeDocument/2006/relationships" xmlns:p="http://schemas.openxmlformats.org/presentationml/2006/main">
   <p:cSld>
     <p:spTree>
@@ -26815,202 +26045,7 @@
 </p:sld>
 </file>
 
-<file path=ppt/slides/slide3.xml><?xml version="1.0" encoding="utf-8"?>
-<p:sld xmlns:a="http://schemas.openxmlformats.org/drawingml/2006/main" xmlns:r="http://schemas.openxmlformats.org/officeDocument/2006/relationships" xmlns:p="http://schemas.openxmlformats.org/presentationml/2006/main">
-  <p:cSld>
-    <p:spTree>
-      <p:nvGrpSpPr>
-        <p:cNvPr id="1" name=""/>
-        <p:cNvGrpSpPr/>
-        <p:nvPr/>
-      </p:nvGrpSpPr>
-      <p:grpSpPr>
-        <a:xfrm>
-          <a:off x="0" y="0"/>
-          <a:ext cx="0" cy="0"/>
-          <a:chOff x="0" y="0"/>
-          <a:chExt cx="0" cy="0"/>
-        </a:xfrm>
-      </p:grpSpPr>
-      <p:sp>
-        <p:nvSpPr>
-          <p:cNvPr id="2" name="Title 1">
-            <a:extLst>
-              <a:ext uri="{FF2B5EF4-FFF2-40B4-BE49-F238E27FC236}">
-                <a16:creationId xmlns:a16="http://schemas.microsoft.com/office/drawing/2014/main" id="{DDA4E5BA-8ABC-4DD2-BF2F-0F06543AB9E3}"/>
-              </a:ext>
-            </a:extLst>
-          </p:cNvPr>
-          <p:cNvSpPr>
-            <a:spLocks noGrp="1"/>
-          </p:cNvSpPr>
-          <p:nvPr>
-            <p:ph type="title"/>
-          </p:nvPr>
-        </p:nvSpPr>
-        <p:spPr>
-          <a:xfrm>
-            <a:off x="1089102" y="123515"/>
-            <a:ext cx="10515600" cy="1093246"/>
-          </a:xfrm>
-        </p:spPr>
-        <p:txBody>
-          <a:bodyPr/>
-          <a:lstStyle/>
-          <a:p>
-            <a:r>
-              <a:rPr lang="en-US" dirty="0">
-                <a:solidFill>
-                  <a:schemeClr val="accent5"/>
-                </a:solidFill>
-                <a:latin typeface="Calibri"/>
-                <a:cs typeface="Calibri"/>
-              </a:rPr>
-              <a:t>Check-In</a:t>
-            </a:r>
-          </a:p>
-        </p:txBody>
-      </p:sp>
-      <p:sp>
-        <p:nvSpPr>
-          <p:cNvPr id="3" name="Content Placeholder 2">
-            <a:extLst>
-              <a:ext uri="{FF2B5EF4-FFF2-40B4-BE49-F238E27FC236}">
-                <a16:creationId xmlns:a16="http://schemas.microsoft.com/office/drawing/2014/main" id="{A68A5DBF-B3BA-4AC8-9EC7-123C654CB295}"/>
-              </a:ext>
-            </a:extLst>
-          </p:cNvPr>
-          <p:cNvSpPr>
-            <a:spLocks noGrp="1"/>
-          </p:cNvSpPr>
-          <p:nvPr>
-            <p:ph idx="1"/>
-          </p:nvPr>
-        </p:nvSpPr>
-        <p:spPr>
-          <a:xfrm>
-            <a:off x="838200" y="1484967"/>
-            <a:ext cx="10515600" cy="4996796"/>
-          </a:xfrm>
-        </p:spPr>
-        <p:txBody>
-          <a:bodyPr vert="horz" lIns="121899" tIns="60949" rIns="121899" bIns="60949" rtlCol="0" anchor="t">
-            <a:normAutofit/>
-          </a:bodyPr>
-          <a:lstStyle/>
-          <a:p>
-            <a:pPr marL="303530" indent="-304165"/>
-            <a:r>
-              <a:rPr lang="en-US" dirty="0">
-                <a:latin typeface="Calibri Light"/>
-                <a:cs typeface="Calibri Light"/>
-              </a:rPr>
-              <a:t>How was this week for you? Any particular challenges or accomplishments? </a:t>
-            </a:r>
-            <a:endParaRPr lang="en-US"/>
-          </a:p>
-          <a:p>
-            <a:pPr marL="303530" indent="-304165"/>
-            <a:endParaRPr lang="en-US" dirty="0">
-              <a:latin typeface="Calibri Light"/>
-              <a:cs typeface="Calibri Light"/>
-            </a:endParaRPr>
-          </a:p>
-          <a:p>
-            <a:pPr marL="303530" indent="-304165"/>
-            <a:r>
-              <a:rPr lang="en-US" dirty="0">
-                <a:latin typeface="Calibri Light"/>
-                <a:cs typeface="Calibri Light"/>
-              </a:rPr>
-              <a:t>Did you understand the Exercises and were you able to complete them? </a:t>
-            </a:r>
-            <a:endParaRPr lang="en-US" dirty="0"/>
-          </a:p>
-          <a:p>
-            <a:pPr marL="303530" indent="-304165"/>
-            <a:endParaRPr lang="en-US" dirty="0">
-              <a:latin typeface="Calibri Light"/>
-              <a:cs typeface="Calibri Light"/>
-            </a:endParaRPr>
-          </a:p>
-          <a:p>
-            <a:pPr marL="303530" indent="-304165"/>
-            <a:r>
-              <a:rPr lang="en-US" dirty="0">
-                <a:latin typeface="Calibri Light"/>
-                <a:cs typeface="Calibri Light"/>
-              </a:rPr>
-              <a:t>How were the Challenges and Quiz this week?</a:t>
-            </a:r>
-            <a:endParaRPr lang="en-US" dirty="0"/>
-          </a:p>
-          <a:p>
-            <a:pPr marL="303530" indent="-304165"/>
-            <a:endParaRPr lang="en-US" dirty="0">
-              <a:latin typeface="Calibri Light"/>
-              <a:cs typeface="Calibri Light"/>
-            </a:endParaRPr>
-          </a:p>
-          <a:p>
-            <a:pPr marL="303530" indent="-304165"/>
-            <a:r>
-              <a:rPr lang="en-US" dirty="0">
-                <a:latin typeface="Calibri Light"/>
-                <a:cs typeface="Calibri Light"/>
-              </a:rPr>
-              <a:t>We know that this was a difficult week for many. Please ask if you have questions.</a:t>
-            </a:r>
-            <a:endParaRPr lang="en-US">
-              <a:cs typeface="Calibri"/>
-            </a:endParaRPr>
-          </a:p>
-        </p:txBody>
-      </p:sp>
-      <p:pic>
-        <p:nvPicPr>
-          <p:cNvPr id="5" name="Picture 6" descr="A picture containing vector graphics&#10;&#10;Description generated with very high confidence">
-            <a:extLst>
-              <a:ext uri="{FF2B5EF4-FFF2-40B4-BE49-F238E27FC236}">
-                <a16:creationId xmlns:a16="http://schemas.microsoft.com/office/drawing/2014/main" id="{E349D8B9-3E3E-4F4A-8DDF-CCE1F7E13775}"/>
-              </a:ext>
-            </a:extLst>
-          </p:cNvPr>
-          <p:cNvPicPr>
-            <a:picLocks noChangeAspect="1"/>
-          </p:cNvPicPr>
-          <p:nvPr/>
-        </p:nvPicPr>
-        <p:blipFill>
-          <a:blip r:embed="rId2"/>
-          <a:stretch>
-            <a:fillRect/>
-          </a:stretch>
-        </p:blipFill>
-        <p:spPr>
-          <a:xfrm>
-            <a:off x="78954" y="126058"/>
-            <a:ext cx="1017225" cy="1097450"/>
-          </a:xfrm>
-          <a:prstGeom prst="rect">
-            <a:avLst/>
-          </a:prstGeom>
-        </p:spPr>
-      </p:pic>
-    </p:spTree>
-    <p:extLst>
-      <p:ext uri="{BB962C8B-B14F-4D97-AF65-F5344CB8AC3E}">
-        <p14:creationId xmlns:p14="http://schemas.microsoft.com/office/powerpoint/2010/main" val="884133132"/>
-      </p:ext>
-    </p:extLst>
-  </p:cSld>
-  <p:clrMapOvr>
-    <a:masterClrMapping/>
-  </p:clrMapOvr>
-</p:sld>
-</file>
-
-<file path=ppt/slides/slide30.xml><?xml version="1.0" encoding="utf-8"?>
+<file path=ppt/slides/slide27.xml><?xml version="1.0" encoding="utf-8"?>
 <p:sld xmlns:a="http://schemas.openxmlformats.org/drawingml/2006/main" xmlns:r="http://schemas.openxmlformats.org/officeDocument/2006/relationships" xmlns:p="http://schemas.openxmlformats.org/presentationml/2006/main">
   <p:cSld>
     <p:spTree>
@@ -27323,7 +26358,7 @@
 </p:sld>
 </file>
 
-<file path=ppt/slides/slide31.xml><?xml version="1.0" encoding="utf-8"?>
+<file path=ppt/slides/slide28.xml><?xml version="1.0" encoding="utf-8"?>
 <p:sld xmlns:a="http://schemas.openxmlformats.org/drawingml/2006/main" xmlns:r="http://schemas.openxmlformats.org/officeDocument/2006/relationships" xmlns:p="http://schemas.openxmlformats.org/presentationml/2006/main">
   <p:cSld>
     <p:spTree>
@@ -27796,183 +26831,7 @@
 </p:sld>
 </file>
 
-<file path=ppt/slides/slide32.xml><?xml version="1.0" encoding="utf-8"?>
-<p:sld xmlns:a="http://schemas.openxmlformats.org/drawingml/2006/main" xmlns:r="http://schemas.openxmlformats.org/officeDocument/2006/relationships" xmlns:p="http://schemas.openxmlformats.org/presentationml/2006/main">
-  <p:cSld>
-    <p:spTree>
-      <p:nvGrpSpPr>
-        <p:cNvPr id="1" name=""/>
-        <p:cNvGrpSpPr/>
-        <p:nvPr/>
-      </p:nvGrpSpPr>
-      <p:grpSpPr>
-        <a:xfrm>
-          <a:off x="0" y="0"/>
-          <a:ext cx="0" cy="0"/>
-          <a:chOff x="0" y="0"/>
-          <a:chExt cx="0" cy="0"/>
-        </a:xfrm>
-      </p:grpSpPr>
-      <p:sp>
-        <p:nvSpPr>
-          <p:cNvPr id="2" name="Title 1">
-            <a:extLst>
-              <a:ext uri="{FF2B5EF4-FFF2-40B4-BE49-F238E27FC236}">
-                <a16:creationId xmlns:a16="http://schemas.microsoft.com/office/drawing/2014/main" id="{AAA92F0D-749A-4D7E-A646-319833DB0DCB}"/>
-              </a:ext>
-            </a:extLst>
-          </p:cNvPr>
-          <p:cNvSpPr>
-            <a:spLocks noGrp="1"/>
-          </p:cNvSpPr>
-          <p:nvPr>
-            <p:ph type="title"/>
-          </p:nvPr>
-        </p:nvSpPr>
-        <p:spPr>
-          <a:xfrm>
-            <a:off x="1098395" y="123515"/>
-            <a:ext cx="10515600" cy="1093246"/>
-          </a:xfrm>
-        </p:spPr>
-        <p:txBody>
-          <a:bodyPr/>
-          <a:lstStyle/>
-          <a:p>
-            <a:r>
-              <a:rPr lang="en-US" dirty="0">
-                <a:solidFill>
-                  <a:schemeClr val="accent5"/>
-                </a:solidFill>
-                <a:latin typeface="Calibri"/>
-                <a:cs typeface="Calibri"/>
-              </a:rPr>
-              <a:t>This Week's Tasks</a:t>
-            </a:r>
-            <a:endParaRPr lang="en-US" dirty="0">
-              <a:solidFill>
-                <a:schemeClr val="accent5"/>
-              </a:solidFill>
-            </a:endParaRPr>
-          </a:p>
-        </p:txBody>
-      </p:sp>
-      <p:sp>
-        <p:nvSpPr>
-          <p:cNvPr id="3" name="Content Placeholder 2">
-            <a:extLst>
-              <a:ext uri="{FF2B5EF4-FFF2-40B4-BE49-F238E27FC236}">
-                <a16:creationId xmlns:a16="http://schemas.microsoft.com/office/drawing/2014/main" id="{874809D9-E083-4F53-B95C-7C6EBFDDE9E6}"/>
-              </a:ext>
-            </a:extLst>
-          </p:cNvPr>
-          <p:cNvSpPr>
-            <a:spLocks noGrp="1"/>
-          </p:cNvSpPr>
-          <p:nvPr>
-            <p:ph idx="1"/>
-          </p:nvPr>
-        </p:nvSpPr>
-        <p:spPr>
-          <a:xfrm>
-            <a:off x="838200" y="1680942"/>
-            <a:ext cx="10515600" cy="4496021"/>
-          </a:xfrm>
-        </p:spPr>
-        <p:txBody>
-          <a:bodyPr vert="horz" lIns="121899" tIns="60949" rIns="121899" bIns="60949" rtlCol="0" anchor="t">
-            <a:normAutofit/>
-          </a:bodyPr>
-          <a:lstStyle/>
-          <a:p>
-            <a:pPr marL="304165" indent="-304165"/>
-            <a:r>
-              <a:rPr lang="en-US" dirty="0">
-                <a:latin typeface="Calibri Light"/>
-                <a:cs typeface="Calibri Light"/>
-              </a:rPr>
-              <a:t>If we have extra time before the Workshop then feel free to bring up any unresolved questions, and to discuss any Challenge Questions or Code Challenges. </a:t>
-            </a:r>
-            <a:endParaRPr lang="en-US" dirty="0"/>
-          </a:p>
-          <a:p>
-            <a:pPr marL="304165" indent="-304165"/>
-            <a:endParaRPr lang="en-US" dirty="0">
-              <a:latin typeface="Calibri Light"/>
-              <a:cs typeface="Calibri Light"/>
-            </a:endParaRPr>
-          </a:p>
-          <a:p>
-            <a:pPr marL="304165" indent="-304165"/>
-            <a:r>
-              <a:rPr lang="en-US" dirty="0">
-                <a:latin typeface="Calibri Light"/>
-                <a:cs typeface="Calibri Light"/>
-              </a:rPr>
-              <a:t>Otherwise, please start the Workshop Assignment and save the discussion for after the assignment is finished, or online. </a:t>
-            </a:r>
-            <a:endParaRPr lang="en-US" dirty="0">
-              <a:cs typeface="Calibri"/>
-            </a:endParaRPr>
-          </a:p>
-        </p:txBody>
-      </p:sp>
-      <p:pic>
-        <p:nvPicPr>
-          <p:cNvPr id="5" name="Picture 6" descr="A picture containing vector graphics&#10;&#10;Description generated with very high confidence">
-            <a:extLst>
-              <a:ext uri="{FF2B5EF4-FFF2-40B4-BE49-F238E27FC236}">
-                <a16:creationId xmlns:a16="http://schemas.microsoft.com/office/drawing/2014/main" id="{B99310F5-5580-4F39-834F-6D52555CBE45}"/>
-              </a:ext>
-            </a:extLst>
-          </p:cNvPr>
-          <p:cNvPicPr>
-            <a:picLocks noChangeAspect="1"/>
-          </p:cNvPicPr>
-          <p:nvPr/>
-        </p:nvPicPr>
-        <p:blipFill>
-          <a:blip r:embed="rId2"/>
-          <a:stretch>
-            <a:fillRect/>
-          </a:stretch>
-        </p:blipFill>
-        <p:spPr>
-          <a:xfrm>
-            <a:off x="78954" y="126058"/>
-            <a:ext cx="1017225" cy="1097450"/>
-          </a:xfrm>
-          <a:prstGeom prst="rect">
-            <a:avLst/>
-          </a:prstGeom>
-        </p:spPr>
-      </p:pic>
-    </p:spTree>
-    <p:extLst>
-      <p:ext uri="{BB962C8B-B14F-4D97-AF65-F5344CB8AC3E}">
-        <p14:creationId xmlns:p14="http://schemas.microsoft.com/office/powerpoint/2010/main" val="3030586912"/>
-      </p:ext>
-    </p:extLst>
-  </p:cSld>
-  <p:clrMapOvr>
-    <a:masterClrMapping/>
-  </p:clrMapOvr>
-  <mc:AlternateContent xmlns:mc="http://schemas.openxmlformats.org/markup-compatibility/2006" xmlns:p14="http://schemas.microsoft.com/office/powerpoint/2010/main">
-    <mc:Choice Requires="p14">
-      <p:transition spd="med" p14:dur="700">
-        <p:fade/>
-      </p:transition>
-    </mc:Choice>
-    <mc:Fallback xmlns="">
-      <p:transition spd="med">
-        <p:fade/>
-      </p:transition>
-    </mc:Fallback>
-  </mc:AlternateContent>
-</p:sld>
-</file>
-
-<file path=ppt/slides/slide33.xml><?xml version="1.0" encoding="utf-8"?>
+<file path=ppt/slides/slide29.xml><?xml version="1.0" encoding="utf-8"?>
 <p:sld xmlns:a="http://schemas.openxmlformats.org/drawingml/2006/main" xmlns:r="http://schemas.openxmlformats.org/officeDocument/2006/relationships" xmlns:p="http://schemas.openxmlformats.org/presentationml/2006/main">
   <p:cSld>
     <p:spTree>
@@ -28277,7 +27136,202 @@
 </p:sld>
 </file>
 
-<file path=ppt/slides/slide34.xml><?xml version="1.0" encoding="utf-8"?>
+<file path=ppt/slides/slide3.xml><?xml version="1.0" encoding="utf-8"?>
+<p:sld xmlns:a="http://schemas.openxmlformats.org/drawingml/2006/main" xmlns:r="http://schemas.openxmlformats.org/officeDocument/2006/relationships" xmlns:p="http://schemas.openxmlformats.org/presentationml/2006/main">
+  <p:cSld>
+    <p:spTree>
+      <p:nvGrpSpPr>
+        <p:cNvPr id="1" name=""/>
+        <p:cNvGrpSpPr/>
+        <p:nvPr/>
+      </p:nvGrpSpPr>
+      <p:grpSpPr>
+        <a:xfrm>
+          <a:off x="0" y="0"/>
+          <a:ext cx="0" cy="0"/>
+          <a:chOff x="0" y="0"/>
+          <a:chExt cx="0" cy="0"/>
+        </a:xfrm>
+      </p:grpSpPr>
+      <p:sp>
+        <p:nvSpPr>
+          <p:cNvPr id="2" name="Title 1">
+            <a:extLst>
+              <a:ext uri="{FF2B5EF4-FFF2-40B4-BE49-F238E27FC236}">
+                <a16:creationId xmlns:a16="http://schemas.microsoft.com/office/drawing/2014/main" id="{DDA4E5BA-8ABC-4DD2-BF2F-0F06543AB9E3}"/>
+              </a:ext>
+            </a:extLst>
+          </p:cNvPr>
+          <p:cNvSpPr>
+            <a:spLocks noGrp="1"/>
+          </p:cNvSpPr>
+          <p:nvPr>
+            <p:ph type="title"/>
+          </p:nvPr>
+        </p:nvSpPr>
+        <p:spPr>
+          <a:xfrm>
+            <a:off x="1089102" y="123515"/>
+            <a:ext cx="10515600" cy="1093246"/>
+          </a:xfrm>
+        </p:spPr>
+        <p:txBody>
+          <a:bodyPr/>
+          <a:lstStyle/>
+          <a:p>
+            <a:r>
+              <a:rPr lang="en-US" dirty="0">
+                <a:solidFill>
+                  <a:schemeClr val="accent5"/>
+                </a:solidFill>
+                <a:latin typeface="Calibri"/>
+                <a:cs typeface="Calibri"/>
+              </a:rPr>
+              <a:t>Check-In</a:t>
+            </a:r>
+          </a:p>
+        </p:txBody>
+      </p:sp>
+      <p:sp>
+        <p:nvSpPr>
+          <p:cNvPr id="3" name="Content Placeholder 2">
+            <a:extLst>
+              <a:ext uri="{FF2B5EF4-FFF2-40B4-BE49-F238E27FC236}">
+                <a16:creationId xmlns:a16="http://schemas.microsoft.com/office/drawing/2014/main" id="{A68A5DBF-B3BA-4AC8-9EC7-123C654CB295}"/>
+              </a:ext>
+            </a:extLst>
+          </p:cNvPr>
+          <p:cNvSpPr>
+            <a:spLocks noGrp="1"/>
+          </p:cNvSpPr>
+          <p:nvPr>
+            <p:ph idx="1"/>
+          </p:nvPr>
+        </p:nvSpPr>
+        <p:spPr>
+          <a:xfrm>
+            <a:off x="838200" y="1484967"/>
+            <a:ext cx="10515600" cy="4996796"/>
+          </a:xfrm>
+        </p:spPr>
+        <p:txBody>
+          <a:bodyPr vert="horz" lIns="121899" tIns="60949" rIns="121899" bIns="60949" rtlCol="0" anchor="t">
+            <a:normAutofit/>
+          </a:bodyPr>
+          <a:lstStyle/>
+          <a:p>
+            <a:pPr marL="303530" indent="-304165"/>
+            <a:r>
+              <a:rPr lang="en-US" dirty="0">
+                <a:latin typeface="Calibri Light"/>
+                <a:cs typeface="Calibri Light"/>
+              </a:rPr>
+              <a:t>How was this week for you? Any particular challenges or accomplishments? </a:t>
+            </a:r>
+            <a:endParaRPr lang="en-US"/>
+          </a:p>
+          <a:p>
+            <a:pPr marL="303530" indent="-304165"/>
+            <a:endParaRPr lang="en-US" dirty="0">
+              <a:latin typeface="Calibri Light"/>
+              <a:cs typeface="Calibri Light"/>
+            </a:endParaRPr>
+          </a:p>
+          <a:p>
+            <a:pPr marL="303530" indent="-304165"/>
+            <a:r>
+              <a:rPr lang="en-US" dirty="0">
+                <a:latin typeface="Calibri Light"/>
+                <a:cs typeface="Calibri Light"/>
+              </a:rPr>
+              <a:t>Did you understand the Exercises and were you able to complete them? </a:t>
+            </a:r>
+            <a:endParaRPr lang="en-US" dirty="0"/>
+          </a:p>
+          <a:p>
+            <a:pPr marL="303530" indent="-304165"/>
+            <a:endParaRPr lang="en-US" dirty="0">
+              <a:latin typeface="Calibri Light"/>
+              <a:cs typeface="Calibri Light"/>
+            </a:endParaRPr>
+          </a:p>
+          <a:p>
+            <a:pPr marL="303530" indent="-304165"/>
+            <a:r>
+              <a:rPr lang="en-US" dirty="0">
+                <a:latin typeface="Calibri Light"/>
+                <a:cs typeface="Calibri Light"/>
+              </a:rPr>
+              <a:t>How were the Challenges and Quiz this week?</a:t>
+            </a:r>
+            <a:endParaRPr lang="en-US" dirty="0"/>
+          </a:p>
+          <a:p>
+            <a:pPr marL="303530" indent="-304165"/>
+            <a:endParaRPr lang="en-US" dirty="0">
+              <a:latin typeface="Calibri Light"/>
+              <a:cs typeface="Calibri Light"/>
+            </a:endParaRPr>
+          </a:p>
+          <a:p>
+            <a:pPr marL="303530" indent="-304165"/>
+            <a:r>
+              <a:rPr lang="en-US" dirty="0">
+                <a:latin typeface="Calibri Light"/>
+                <a:cs typeface="Calibri Light"/>
+              </a:rPr>
+              <a:t>We know that this was a difficult week for many. Please ask if you have questions.</a:t>
+            </a:r>
+            <a:endParaRPr lang="en-US">
+              <a:cs typeface="Calibri"/>
+            </a:endParaRPr>
+          </a:p>
+        </p:txBody>
+      </p:sp>
+      <p:pic>
+        <p:nvPicPr>
+          <p:cNvPr id="5" name="Picture 6" descr="A picture containing vector graphics&#10;&#10;Description generated with very high confidence">
+            <a:extLst>
+              <a:ext uri="{FF2B5EF4-FFF2-40B4-BE49-F238E27FC236}">
+                <a16:creationId xmlns:a16="http://schemas.microsoft.com/office/drawing/2014/main" id="{E349D8B9-3E3E-4F4A-8DDF-CCE1F7E13775}"/>
+              </a:ext>
+            </a:extLst>
+          </p:cNvPr>
+          <p:cNvPicPr>
+            <a:picLocks noChangeAspect="1"/>
+          </p:cNvPicPr>
+          <p:nvPr/>
+        </p:nvPicPr>
+        <p:blipFill>
+          <a:blip r:embed="rId2"/>
+          <a:stretch>
+            <a:fillRect/>
+          </a:stretch>
+        </p:blipFill>
+        <p:spPr>
+          <a:xfrm>
+            <a:off x="78954" y="126058"/>
+            <a:ext cx="1017225" cy="1097450"/>
+          </a:xfrm>
+          <a:prstGeom prst="rect">
+            <a:avLst/>
+          </a:prstGeom>
+        </p:spPr>
+      </p:pic>
+    </p:spTree>
+    <p:extLst>
+      <p:ext uri="{BB962C8B-B14F-4D97-AF65-F5344CB8AC3E}">
+        <p14:creationId xmlns:p14="http://schemas.microsoft.com/office/powerpoint/2010/main" val="884133132"/>
+      </p:ext>
+    </p:extLst>
+  </p:cSld>
+  <p:clrMapOvr>
+    <a:masterClrMapping/>
+  </p:clrMapOvr>
+</p:sld>
+</file>
+
+<file path=ppt/slides/slide30.xml><?xml version="1.0" encoding="utf-8"?>
 <p:sld xmlns:a="http://schemas.openxmlformats.org/drawingml/2006/main" xmlns:r="http://schemas.openxmlformats.org/officeDocument/2006/relationships" xmlns:p="http://schemas.openxmlformats.org/presentationml/2006/main">
   <p:cSld>
     <p:spTree>
@@ -28451,7 +27505,7 @@
 </p:sld>
 </file>
 
-<file path=ppt/slides/slide35.xml><?xml version="1.0" encoding="utf-8"?>
+<file path=ppt/slides/slide31.xml><?xml version="1.0" encoding="utf-8"?>
 <p:sld xmlns:a="http://schemas.openxmlformats.org/drawingml/2006/main" xmlns:r="http://schemas.openxmlformats.org/officeDocument/2006/relationships" xmlns:p="http://schemas.openxmlformats.org/presentationml/2006/main">
   <p:cSld>
     <p:spTree>
@@ -28806,7 +27860,7 @@
 </p:sld>
 </file>
 
-<file path=ppt/slides/slide36.xml><?xml version="1.0" encoding="utf-8"?>
+<file path=ppt/slides/slide32.xml><?xml version="1.0" encoding="utf-8"?>
 <p:sld xmlns:a="http://schemas.openxmlformats.org/drawingml/2006/main" xmlns:r="http://schemas.openxmlformats.org/officeDocument/2006/relationships" xmlns:p="http://schemas.openxmlformats.org/presentationml/2006/main">
   <p:cSld>
     <p:spTree>
@@ -32890,6 +31944,15 @@
 </file>
 
 <file path=customXml/item1.xml><?xml version="1.0" encoding="utf-8"?>
+<?mso-contentType ?>
+<FormTemplates xmlns="http://schemas.microsoft.com/sharepoint/v3/contenttype/forms">
+  <Display>DocumentLibraryForm</Display>
+  <Edit>DocumentLibraryForm</Edit>
+  <New>DocumentLibraryForm</New>
+</FormTemplates>
+</file>
+
+<file path=customXml/item2.xml><?xml version="1.0" encoding="utf-8"?>
 <ct:contentTypeSchema xmlns:ct="http://schemas.microsoft.com/office/2006/metadata/contentType" xmlns:ma="http://schemas.microsoft.com/office/2006/metadata/properties/metaAttributes" ct:_="" ma:_="" ma:contentTypeName="Document" ma:contentTypeID="0x010100E5B518C2C025244AAA92C8D1EA47F712" ma:contentTypeVersion="12" ma:contentTypeDescription="Create a new document." ma:contentTypeScope="" ma:versionID="8a80f539ab14c28884f19bf2ae5a155a">
   <xsd:schema xmlns:xsd="http://www.w3.org/2001/XMLSchema" xmlns:xs="http://www.w3.org/2001/XMLSchema" xmlns:p="http://schemas.microsoft.com/office/2006/metadata/properties" xmlns:ns2="16f20abe-2aa5-4db9-8990-dbab721f8099" xmlns:ns3="231d7f23-75d9-4084-a6bc-b304ad326553" targetNamespace="http://schemas.microsoft.com/office/2006/metadata/properties" ma:root="true" ma:fieldsID="16b9d397e10991d6f7c5ad7e2f2db9a6" ns2:_="" ns3:_="">
     <xsd:import namespace="16f20abe-2aa5-4db9-8990-dbab721f8099"/>
@@ -33106,22 +32169,21 @@
 </ct:contentTypeSchema>
 </file>
 
-<file path=customXml/item2.xml><?xml version="1.0" encoding="utf-8"?>
+<file path=customXml/item3.xml><?xml version="1.0" encoding="utf-8"?>
 <p:properties xmlns:p="http://schemas.microsoft.com/office/2006/metadata/properties" xmlns:xsi="http://www.w3.org/2001/XMLSchema-instance" xmlns:pc="http://schemas.microsoft.com/office/infopath/2007/PartnerControls">
   <documentManagement/>
 </p:properties>
 </file>
 
-<file path=customXml/item3.xml><?xml version="1.0" encoding="utf-8"?>
-<?mso-contentType ?>
-<FormTemplates xmlns="http://schemas.microsoft.com/sharepoint/v3/contenttype/forms">
-  <Display>DocumentLibraryForm</Display>
-  <Edit>DocumentLibraryForm</Edit>
-  <New>DocumentLibraryForm</New>
-</FormTemplates>
+<file path=customXml/itemProps1.xml><?xml version="1.0" encoding="utf-8"?>
+<ds:datastoreItem xmlns:ds="http://schemas.openxmlformats.org/officeDocument/2006/customXml" ds:itemID="{BB97E460-4357-4A56-8F6A-9F125F59AA76}">
+  <ds:schemaRefs>
+    <ds:schemaRef ds:uri="http://schemas.microsoft.com/sharepoint/v3/contenttype/forms"/>
+  </ds:schemaRefs>
+</ds:datastoreItem>
 </file>
 
-<file path=customXml/itemProps1.xml><?xml version="1.0" encoding="utf-8"?>
+<file path=customXml/itemProps2.xml><?xml version="1.0" encoding="utf-8"?>
 <ds:datastoreItem xmlns:ds="http://schemas.openxmlformats.org/officeDocument/2006/customXml" ds:itemID="{602C9F0D-1067-416A-AA1C-C2DF3430B4C7}">
   <ds:schemaRefs>
     <ds:schemaRef ds:uri="http://schemas.microsoft.com/office/2006/metadata/contentType"/>
@@ -33140,7 +32202,7 @@
 </ds:datastoreItem>
 </file>
 
-<file path=customXml/itemProps2.xml><?xml version="1.0" encoding="utf-8"?>
+<file path=customXml/itemProps3.xml><?xml version="1.0" encoding="utf-8"?>
 <ds:datastoreItem xmlns:ds="http://schemas.openxmlformats.org/officeDocument/2006/customXml" ds:itemID="{F1F6A908-9041-4D6B-AC6F-E09EA0EBA2F9}">
   <ds:schemaRefs>
     <ds:schemaRef ds:uri="16f20abe-2aa5-4db9-8990-dbab721f8099"/>
@@ -33155,12 +32217,4 @@
     <ds:schemaRef ds:uri="http://www.w3.org/XML/1998/namespace"/>
   </ds:schemaRefs>
 </ds:datastoreItem>
-</file>
-
-<file path=customXml/itemProps3.xml><?xml version="1.0" encoding="utf-8"?>
-<ds:datastoreItem xmlns:ds="http://schemas.openxmlformats.org/officeDocument/2006/customXml" ds:itemID="{BB97E460-4357-4A56-8F6A-9F125F59AA76}">
-  <ds:schemaRefs>
-    <ds:schemaRef ds:uri="http://schemas.microsoft.com/sharepoint/v3/contenttype/forms"/>
-  </ds:schemaRefs>
-</ds:datastoreItem>
 </file>
</xml_diff>